<commit_message>
Added calls to/from IBM Event Streams
</commit_message>
<xml_diff>
--- a/lab/Stock Trader Sample - Diagram.pptx
+++ b/lab/Stock Trader Sample - Diagram.pptx
@@ -228,7 +228,7 @@
             <a:fld id="{D0752B3F-16DD-4F19-ACDD-F2069BC5BD4E}" type="datetimeFigureOut">
               <a:rPr lang="en-US" smtClean="0"/>
               <a:pPr/>
-              <a:t>6/8/18</a:t>
+              <a:t>12/3/18</a:t>
             </a:fld>
             <a:endParaRPr lang="en-US"/>
           </a:p>
@@ -395,7 +395,7 @@
             <a:fld id="{9FA6D163-A0F5-498D-A72B-50DE16555140}" type="datetimeFigureOut">
               <a:rPr lang="en-US" smtClean="0"/>
               <a:pPr/>
-              <a:t>6/8/18</a:t>
+              <a:t>12/3/18</a:t>
             </a:fld>
             <a:endParaRPr lang="en-US"/>
           </a:p>
@@ -4911,7 +4911,7 @@
           </a:ln>
           <a:extLst>
             <a:ext uri="{C572A759-6A51-4108-AA02-DFA0A04FC94B}">
-              <ma14:wrappingTextBoxFlag xmlns="" xmlns:ma14="http://schemas.microsoft.com/office/mac/drawingml/2011/main" val="1"/>
+              <ma14:wrappingTextBoxFlag xmlns:ma14="http://schemas.microsoft.com/office/mac/drawingml/2011/main" xmlns="" val="1"/>
             </a:ext>
           </a:extLst>
         </p:spPr>
@@ -5401,17 +5401,17 @@
           </a:ln>
           <a:extLst>
             <a:ext uri="{FAA26D3D-D897-4be2-8F04-BA451C77F1D7}">
-              <ma14:placeholderFlag xmlns:ma14="http://schemas.microsoft.com/office/mac/drawingml/2011/main" xmlns="" val="1"/>
+              <ma14:placeholderFlag xmlns="" xmlns:ma14="http://schemas.microsoft.com/office/mac/drawingml/2011/main" val="1"/>
             </a:ext>
             <a:ext uri="{909E8E84-426E-40dd-AFC4-6F175D3DCCD1}">
-              <a14:hiddenFill xmlns:a14="http://schemas.microsoft.com/office/drawing/2010/main" xmlns="">
+              <a14:hiddenFill xmlns="" xmlns:a14="http://schemas.microsoft.com/office/drawing/2010/main">
                 <a:solidFill>
                   <a:srgbClr val="FFFFFF"/>
                 </a:solidFill>
               </a14:hiddenFill>
             </a:ext>
             <a:ext uri="{91240B29-F687-4f45-9708-019B960494DF}">
-              <a14:hiddenLine xmlns:a14="http://schemas.microsoft.com/office/drawing/2010/main" xmlns="" w="9525">
+              <a14:hiddenLine xmlns="" xmlns:a14="http://schemas.microsoft.com/office/drawing/2010/main" w="9525">
                 <a:solidFill>
                   <a:srgbClr val="000000"/>
                 </a:solidFill>
@@ -5947,17 +5947,17 @@
           </a:ln>
           <a:extLst>
             <a:ext uri="{FAA26D3D-D897-4be2-8F04-BA451C77F1D7}">
-              <ma14:placeholderFlag xmlns:ma14="http://schemas.microsoft.com/office/mac/drawingml/2011/main" xmlns="" val="1"/>
+              <ma14:placeholderFlag xmlns="" xmlns:ma14="http://schemas.microsoft.com/office/mac/drawingml/2011/main" val="1"/>
             </a:ext>
             <a:ext uri="{909E8E84-426E-40dd-AFC4-6F175D3DCCD1}">
-              <a14:hiddenFill xmlns:a14="http://schemas.microsoft.com/office/drawing/2010/main" xmlns="">
+              <a14:hiddenFill xmlns="" xmlns:a14="http://schemas.microsoft.com/office/drawing/2010/main">
                 <a:solidFill>
                   <a:srgbClr val="FFFFFF"/>
                 </a:solidFill>
               </a14:hiddenFill>
             </a:ext>
             <a:ext uri="{91240B29-F687-4f45-9708-019B960494DF}">
-              <a14:hiddenLine xmlns:a14="http://schemas.microsoft.com/office/drawing/2010/main" xmlns="" w="9525">
+              <a14:hiddenLine xmlns="" xmlns:a14="http://schemas.microsoft.com/office/drawing/2010/main" w="9525">
                 <a:solidFill>
                   <a:srgbClr val="000000"/>
                 </a:solidFill>
@@ -6432,17 +6432,17 @@
           </a:ln>
           <a:extLst>
             <a:ext uri="{FAA26D3D-D897-4be2-8F04-BA451C77F1D7}">
-              <ma14:placeholderFlag xmlns:ma14="http://schemas.microsoft.com/office/mac/drawingml/2011/main" xmlns="" val="1"/>
+              <ma14:placeholderFlag xmlns="" xmlns:ma14="http://schemas.microsoft.com/office/mac/drawingml/2011/main" val="1"/>
             </a:ext>
             <a:ext uri="{909E8E84-426E-40dd-AFC4-6F175D3DCCD1}">
-              <a14:hiddenFill xmlns:a14="http://schemas.microsoft.com/office/drawing/2010/main" xmlns="">
+              <a14:hiddenFill xmlns="" xmlns:a14="http://schemas.microsoft.com/office/drawing/2010/main">
                 <a:solidFill>
                   <a:srgbClr val="FFFFFF"/>
                 </a:solidFill>
               </a14:hiddenFill>
             </a:ext>
             <a:ext uri="{91240B29-F687-4f45-9708-019B960494DF}">
-              <a14:hiddenLine xmlns:a14="http://schemas.microsoft.com/office/drawing/2010/main" xmlns="" w="9525">
+              <a14:hiddenLine xmlns="" xmlns:a14="http://schemas.microsoft.com/office/drawing/2010/main" w="9525">
                 <a:solidFill>
                   <a:srgbClr val="000000"/>
                 </a:solidFill>
@@ -6547,17 +6547,17 @@
           </a:ln>
           <a:extLst>
             <a:ext uri="{FAA26D3D-D897-4be2-8F04-BA451C77F1D7}">
-              <ma14:placeholderFlag xmlns:ma14="http://schemas.microsoft.com/office/mac/drawingml/2011/main" xmlns="" val="1"/>
+              <ma14:placeholderFlag xmlns="" xmlns:ma14="http://schemas.microsoft.com/office/mac/drawingml/2011/main" val="1"/>
             </a:ext>
             <a:ext uri="{909E8E84-426E-40dd-AFC4-6F175D3DCCD1}">
-              <a14:hiddenFill xmlns:a14="http://schemas.microsoft.com/office/drawing/2010/main" xmlns="">
+              <a14:hiddenFill xmlns="" xmlns:a14="http://schemas.microsoft.com/office/drawing/2010/main">
                 <a:solidFill>
                   <a:srgbClr val="FFFFFF"/>
                 </a:solidFill>
               </a14:hiddenFill>
             </a:ext>
             <a:ext uri="{91240B29-F687-4f45-9708-019B960494DF}">
-              <a14:hiddenLine xmlns:a14="http://schemas.microsoft.com/office/drawing/2010/main" xmlns="" w="9525">
+              <a14:hiddenLine xmlns="" xmlns:a14="http://schemas.microsoft.com/office/drawing/2010/main" w="9525">
                 <a:solidFill>
                   <a:srgbClr val="000000"/>
                 </a:solidFill>
@@ -7779,17 +7779,17 @@
           </a:ln>
           <a:extLst>
             <a:ext uri="{FAA26D3D-D897-4be2-8F04-BA451C77F1D7}">
-              <ma14:placeholderFlag xmlns:ma14="http://schemas.microsoft.com/office/mac/drawingml/2011/main" xmlns="" val="1"/>
+              <ma14:placeholderFlag xmlns="" xmlns:ma14="http://schemas.microsoft.com/office/mac/drawingml/2011/main" val="1"/>
             </a:ext>
             <a:ext uri="{909E8E84-426E-40dd-AFC4-6F175D3DCCD1}">
-              <a14:hiddenFill xmlns:a14="http://schemas.microsoft.com/office/drawing/2010/main" xmlns="">
+              <a14:hiddenFill xmlns="" xmlns:a14="http://schemas.microsoft.com/office/drawing/2010/main">
                 <a:solidFill>
                   <a:srgbClr val="FFFFFF"/>
                 </a:solidFill>
               </a14:hiddenFill>
             </a:ext>
             <a:ext uri="{91240B29-F687-4f45-9708-019B960494DF}">
-              <a14:hiddenLine xmlns:a14="http://schemas.microsoft.com/office/drawing/2010/main" xmlns="" w="9525">
+              <a14:hiddenLine xmlns="" xmlns:a14="http://schemas.microsoft.com/office/drawing/2010/main" w="9525">
                 <a:solidFill>
                   <a:srgbClr val="000000"/>
                 </a:solidFill>
@@ -8682,17 +8682,17 @@
           </a:ln>
           <a:extLst>
             <a:ext uri="{FAA26D3D-D897-4be2-8F04-BA451C77F1D7}">
-              <ma14:placeholderFlag xmlns:ma14="http://schemas.microsoft.com/office/mac/drawingml/2011/main" xmlns="" val="1"/>
+              <ma14:placeholderFlag xmlns="" xmlns:ma14="http://schemas.microsoft.com/office/mac/drawingml/2011/main" val="1"/>
             </a:ext>
             <a:ext uri="{909E8E84-426E-40dd-AFC4-6F175D3DCCD1}">
-              <a14:hiddenFill xmlns:a14="http://schemas.microsoft.com/office/drawing/2010/main" xmlns="">
+              <a14:hiddenFill xmlns="" xmlns:a14="http://schemas.microsoft.com/office/drawing/2010/main">
                 <a:solidFill>
                   <a:srgbClr val="FFFFFF"/>
                 </a:solidFill>
               </a14:hiddenFill>
             </a:ext>
             <a:ext uri="{91240B29-F687-4f45-9708-019B960494DF}">
-              <a14:hiddenLine xmlns:a14="http://schemas.microsoft.com/office/drawing/2010/main" xmlns="" w="9525">
+              <a14:hiddenLine xmlns="" xmlns:a14="http://schemas.microsoft.com/office/drawing/2010/main" w="9525">
                 <a:solidFill>
                   <a:srgbClr val="000000"/>
                 </a:solidFill>
@@ -9411,17 +9411,17 @@
           </a:ln>
           <a:extLst>
             <a:ext uri="{FAA26D3D-D897-4be2-8F04-BA451C77F1D7}">
-              <ma14:placeholderFlag xmlns:ma14="http://schemas.microsoft.com/office/mac/drawingml/2011/main" xmlns="" val="1"/>
+              <ma14:placeholderFlag xmlns="" xmlns:ma14="http://schemas.microsoft.com/office/mac/drawingml/2011/main" val="1"/>
             </a:ext>
             <a:ext uri="{909E8E84-426E-40dd-AFC4-6F175D3DCCD1}">
-              <a14:hiddenFill xmlns:a14="http://schemas.microsoft.com/office/drawing/2010/main" xmlns="">
+              <a14:hiddenFill xmlns="" xmlns:a14="http://schemas.microsoft.com/office/drawing/2010/main">
                 <a:solidFill>
                   <a:srgbClr val="FFFFFF"/>
                 </a:solidFill>
               </a14:hiddenFill>
             </a:ext>
             <a:ext uri="{91240B29-F687-4f45-9708-019B960494DF}">
-              <a14:hiddenLine xmlns:a14="http://schemas.microsoft.com/office/drawing/2010/main" xmlns="" w="9525">
+              <a14:hiddenLine xmlns="" xmlns:a14="http://schemas.microsoft.com/office/drawing/2010/main" w="9525">
                 <a:solidFill>
                   <a:srgbClr val="000000"/>
                 </a:solidFill>
@@ -9896,17 +9896,17 @@
           </a:ln>
           <a:extLst>
             <a:ext uri="{FAA26D3D-D897-4be2-8F04-BA451C77F1D7}">
-              <ma14:placeholderFlag xmlns:ma14="http://schemas.microsoft.com/office/mac/drawingml/2011/main" xmlns="" val="1"/>
+              <ma14:placeholderFlag xmlns="" xmlns:ma14="http://schemas.microsoft.com/office/mac/drawingml/2011/main" val="1"/>
             </a:ext>
             <a:ext uri="{909E8E84-426E-40dd-AFC4-6F175D3DCCD1}">
-              <a14:hiddenFill xmlns:a14="http://schemas.microsoft.com/office/drawing/2010/main" xmlns="">
+              <a14:hiddenFill xmlns="" xmlns:a14="http://schemas.microsoft.com/office/drawing/2010/main">
                 <a:solidFill>
                   <a:srgbClr val="FFFFFF"/>
                 </a:solidFill>
               </a14:hiddenFill>
             </a:ext>
             <a:ext uri="{91240B29-F687-4f45-9708-019B960494DF}">
-              <a14:hiddenLine xmlns:a14="http://schemas.microsoft.com/office/drawing/2010/main" xmlns="" w="9525">
+              <a14:hiddenLine xmlns="" xmlns:a14="http://schemas.microsoft.com/office/drawing/2010/main" w="9525">
                 <a:solidFill>
                   <a:srgbClr val="000000"/>
                 </a:solidFill>
@@ -10011,17 +10011,17 @@
           </a:ln>
           <a:extLst>
             <a:ext uri="{FAA26D3D-D897-4be2-8F04-BA451C77F1D7}">
-              <ma14:placeholderFlag xmlns:ma14="http://schemas.microsoft.com/office/mac/drawingml/2011/main" xmlns="" val="1"/>
+              <ma14:placeholderFlag xmlns="" xmlns:ma14="http://schemas.microsoft.com/office/mac/drawingml/2011/main" val="1"/>
             </a:ext>
             <a:ext uri="{909E8E84-426E-40dd-AFC4-6F175D3DCCD1}">
-              <a14:hiddenFill xmlns:a14="http://schemas.microsoft.com/office/drawing/2010/main" xmlns="">
+              <a14:hiddenFill xmlns="" xmlns:a14="http://schemas.microsoft.com/office/drawing/2010/main">
                 <a:solidFill>
                   <a:srgbClr val="FFFFFF"/>
                 </a:solidFill>
               </a14:hiddenFill>
             </a:ext>
             <a:ext uri="{91240B29-F687-4f45-9708-019B960494DF}">
-              <a14:hiddenLine xmlns:a14="http://schemas.microsoft.com/office/drawing/2010/main" xmlns="" w="9525">
+              <a14:hiddenLine xmlns="" xmlns:a14="http://schemas.microsoft.com/office/drawing/2010/main" w="9525">
                 <a:solidFill>
                   <a:srgbClr val="000000"/>
                 </a:solidFill>
@@ -10967,17 +10967,17 @@
           </a:ln>
           <a:extLst>
             <a:ext uri="{FAA26D3D-D897-4be2-8F04-BA451C77F1D7}">
-              <ma14:placeholderFlag xmlns:ma14="http://schemas.microsoft.com/office/mac/drawingml/2011/main" xmlns="" val="1"/>
+              <ma14:placeholderFlag xmlns="" xmlns:ma14="http://schemas.microsoft.com/office/mac/drawingml/2011/main" val="1"/>
             </a:ext>
             <a:ext uri="{909E8E84-426E-40dd-AFC4-6F175D3DCCD1}">
-              <a14:hiddenFill xmlns:a14="http://schemas.microsoft.com/office/drawing/2010/main" xmlns="">
+              <a14:hiddenFill xmlns="" xmlns:a14="http://schemas.microsoft.com/office/drawing/2010/main">
                 <a:solidFill>
                   <a:srgbClr val="FFFFFF"/>
                 </a:solidFill>
               </a14:hiddenFill>
             </a:ext>
             <a:ext uri="{91240B29-F687-4f45-9708-019B960494DF}">
-              <a14:hiddenLine xmlns:a14="http://schemas.microsoft.com/office/drawing/2010/main" xmlns="" w="9525">
+              <a14:hiddenLine xmlns="" xmlns:a14="http://schemas.microsoft.com/office/drawing/2010/main" w="9525">
                 <a:solidFill>
                   <a:srgbClr val="000000"/>
                 </a:solidFill>
@@ -13325,17 +13325,17 @@
           </a:ln>
           <a:extLst>
             <a:ext uri="{FAA26D3D-D897-4be2-8F04-BA451C77F1D7}">
-              <ma14:placeholderFlag xmlns:ma14="http://schemas.microsoft.com/office/mac/drawingml/2011/main" xmlns="" val="1"/>
+              <ma14:placeholderFlag xmlns="" xmlns:ma14="http://schemas.microsoft.com/office/mac/drawingml/2011/main" val="1"/>
             </a:ext>
             <a:ext uri="{909E8E84-426E-40dd-AFC4-6F175D3DCCD1}">
-              <a14:hiddenFill xmlns:a14="http://schemas.microsoft.com/office/drawing/2010/main" xmlns="">
+              <a14:hiddenFill xmlns="" xmlns:a14="http://schemas.microsoft.com/office/drawing/2010/main">
                 <a:solidFill>
                   <a:srgbClr val="FFFFFF"/>
                 </a:solidFill>
               </a14:hiddenFill>
             </a:ext>
             <a:ext uri="{91240B29-F687-4f45-9708-019B960494DF}">
-              <a14:hiddenLine xmlns:a14="http://schemas.microsoft.com/office/drawing/2010/main" xmlns="" w="9525">
+              <a14:hiddenLine xmlns="" xmlns:a14="http://schemas.microsoft.com/office/drawing/2010/main" w="9525">
                 <a:solidFill>
                   <a:srgbClr val="000000"/>
                 </a:solidFill>
@@ -13419,14 +13419,14 @@
           </a:ln>
           <a:extLst>
             <a:ext uri="{909E8E84-426E-40dd-AFC4-6F175D3DCCD1}">
-              <a14:hiddenFill xmlns:a14="http://schemas.microsoft.com/office/drawing/2010/main" xmlns="">
+              <a14:hiddenFill xmlns="" xmlns:a14="http://schemas.microsoft.com/office/drawing/2010/main">
                 <a:solidFill>
                   <a:srgbClr val="FFFFFF"/>
                 </a:solidFill>
               </a14:hiddenFill>
             </a:ext>
             <a:ext uri="{91240B29-F687-4f45-9708-019B960494DF}">
-              <a14:hiddenLine xmlns:a14="http://schemas.microsoft.com/office/drawing/2010/main" xmlns="" w="9525">
+              <a14:hiddenLine xmlns="" xmlns:a14="http://schemas.microsoft.com/office/drawing/2010/main" w="9525">
                 <a:solidFill>
                   <a:srgbClr val="000000"/>
                 </a:solidFill>
@@ -13513,14 +13513,14 @@
           </a:ln>
           <a:extLst>
             <a:ext uri="{909E8E84-426E-40dd-AFC4-6F175D3DCCD1}">
-              <a14:hiddenFill xmlns:a14="http://schemas.microsoft.com/office/drawing/2010/main" xmlns="">
+              <a14:hiddenFill xmlns="" xmlns:a14="http://schemas.microsoft.com/office/drawing/2010/main">
                 <a:solidFill>
                   <a:srgbClr val="FFFFFF"/>
                 </a:solidFill>
               </a14:hiddenFill>
             </a:ext>
             <a:ext uri="{91240B29-F687-4f45-9708-019B960494DF}">
-              <a14:hiddenLine xmlns:a14="http://schemas.microsoft.com/office/drawing/2010/main" xmlns="" w="9525">
+              <a14:hiddenLine xmlns="" xmlns:a14="http://schemas.microsoft.com/office/drawing/2010/main" w="9525">
                 <a:solidFill>
                   <a:srgbClr val="000000"/>
                 </a:solidFill>
@@ -13600,14 +13600,14 @@
           </a:ln>
           <a:extLst>
             <a:ext uri="{909E8E84-426E-40dd-AFC4-6F175D3DCCD1}">
-              <a14:hiddenFill xmlns:a14="http://schemas.microsoft.com/office/drawing/2010/main" xmlns="">
+              <a14:hiddenFill xmlns="" xmlns:a14="http://schemas.microsoft.com/office/drawing/2010/main">
                 <a:solidFill>
                   <a:srgbClr val="FFFFFF"/>
                 </a:solidFill>
               </a14:hiddenFill>
             </a:ext>
             <a:ext uri="{91240B29-F687-4f45-9708-019B960494DF}">
-              <a14:hiddenLine xmlns:a14="http://schemas.microsoft.com/office/drawing/2010/main" xmlns="" w="9525">
+              <a14:hiddenLine xmlns="" xmlns:a14="http://schemas.microsoft.com/office/drawing/2010/main" w="9525">
                 <a:solidFill>
                   <a:srgbClr val="000000"/>
                 </a:solidFill>
@@ -14195,17 +14195,17 @@
           </a:ln>
           <a:extLst>
             <a:ext uri="{FAA26D3D-D897-4be2-8F04-BA451C77F1D7}">
-              <ma14:placeholderFlag xmlns:ma14="http://schemas.microsoft.com/office/mac/drawingml/2011/main" xmlns="" val="1"/>
+              <ma14:placeholderFlag xmlns="" xmlns:ma14="http://schemas.microsoft.com/office/mac/drawingml/2011/main" val="1"/>
             </a:ext>
             <a:ext uri="{909E8E84-426E-40dd-AFC4-6F175D3DCCD1}">
-              <a14:hiddenFill xmlns:a14="http://schemas.microsoft.com/office/drawing/2010/main" xmlns="">
+              <a14:hiddenFill xmlns="" xmlns:a14="http://schemas.microsoft.com/office/drawing/2010/main">
                 <a:solidFill>
                   <a:srgbClr val="FFFFFF"/>
                 </a:solidFill>
               </a14:hiddenFill>
             </a:ext>
             <a:ext uri="{91240B29-F687-4f45-9708-019B960494DF}">
-              <a14:hiddenLine xmlns:a14="http://schemas.microsoft.com/office/drawing/2010/main" xmlns="" w="9525">
+              <a14:hiddenLine xmlns="" xmlns:a14="http://schemas.microsoft.com/office/drawing/2010/main" w="9525">
                 <a:solidFill>
                   <a:srgbClr val="000000"/>
                 </a:solidFill>
@@ -14289,14 +14289,14 @@
           </a:ln>
           <a:extLst>
             <a:ext uri="{909E8E84-426E-40dd-AFC4-6F175D3DCCD1}">
-              <a14:hiddenFill xmlns:a14="http://schemas.microsoft.com/office/drawing/2010/main" xmlns="">
+              <a14:hiddenFill xmlns="" xmlns:a14="http://schemas.microsoft.com/office/drawing/2010/main">
                 <a:solidFill>
                   <a:srgbClr val="FFFFFF"/>
                 </a:solidFill>
               </a14:hiddenFill>
             </a:ext>
             <a:ext uri="{91240B29-F687-4f45-9708-019B960494DF}">
-              <a14:hiddenLine xmlns:a14="http://schemas.microsoft.com/office/drawing/2010/main" xmlns="" w="9525">
+              <a14:hiddenLine xmlns="" xmlns:a14="http://schemas.microsoft.com/office/drawing/2010/main" w="9525">
                 <a:solidFill>
                   <a:srgbClr val="000000"/>
                 </a:solidFill>
@@ -14383,14 +14383,14 @@
           </a:ln>
           <a:extLst>
             <a:ext uri="{909E8E84-426E-40dd-AFC4-6F175D3DCCD1}">
-              <a14:hiddenFill xmlns:a14="http://schemas.microsoft.com/office/drawing/2010/main" xmlns="">
+              <a14:hiddenFill xmlns="" xmlns:a14="http://schemas.microsoft.com/office/drawing/2010/main">
                 <a:solidFill>
                   <a:srgbClr val="FFFFFF"/>
                 </a:solidFill>
               </a14:hiddenFill>
             </a:ext>
             <a:ext uri="{91240B29-F687-4f45-9708-019B960494DF}">
-              <a14:hiddenLine xmlns:a14="http://schemas.microsoft.com/office/drawing/2010/main" xmlns="" w="9525">
+              <a14:hiddenLine xmlns="" xmlns:a14="http://schemas.microsoft.com/office/drawing/2010/main" w="9525">
                 <a:solidFill>
                   <a:srgbClr val="000000"/>
                 </a:solidFill>
@@ -14470,14 +14470,14 @@
           </a:ln>
           <a:extLst>
             <a:ext uri="{909E8E84-426E-40dd-AFC4-6F175D3DCCD1}">
-              <a14:hiddenFill xmlns:a14="http://schemas.microsoft.com/office/drawing/2010/main" xmlns="">
+              <a14:hiddenFill xmlns="" xmlns:a14="http://schemas.microsoft.com/office/drawing/2010/main">
                 <a:solidFill>
                   <a:srgbClr val="FFFFFF"/>
                 </a:solidFill>
               </a14:hiddenFill>
             </a:ext>
             <a:ext uri="{91240B29-F687-4f45-9708-019B960494DF}">
-              <a14:hiddenLine xmlns:a14="http://schemas.microsoft.com/office/drawing/2010/main" xmlns="" w="9525">
+              <a14:hiddenLine xmlns="" xmlns:a14="http://schemas.microsoft.com/office/drawing/2010/main" w="9525">
                 <a:solidFill>
                   <a:srgbClr val="000000"/>
                 </a:solidFill>
@@ -15096,8 +15096,8 @@
         </p:nvSpPr>
         <p:spPr>
           <a:xfrm>
-            <a:off x="2019300" y="749300"/>
-            <a:ext cx="5778500" cy="6045200"/>
+            <a:off x="1828595" y="777608"/>
+            <a:ext cx="5969483" cy="6045200"/>
           </a:xfrm>
           <a:prstGeom prst="rect">
             <a:avLst/>
@@ -16007,7 +16007,7 @@
         </p:nvSpPr>
         <p:spPr>
           <a:xfrm>
-            <a:off x="8300598" y="2061546"/>
+            <a:off x="8311108" y="2093076"/>
             <a:ext cx="357149" cy="215444"/>
           </a:xfrm>
           <a:prstGeom prst="rect">
@@ -17252,7 +17252,7 @@
         </p:nvSpPr>
         <p:spPr>
           <a:xfrm>
-            <a:off x="10367278" y="2066331"/>
+            <a:off x="10367278" y="2076841"/>
             <a:ext cx="357149" cy="215444"/>
           </a:xfrm>
           <a:prstGeom prst="rect">
@@ -17293,7 +17293,7 @@
         </p:nvSpPr>
         <p:spPr>
           <a:xfrm>
-            <a:off x="10246028" y="4994976"/>
+            <a:off x="10246028" y="5005486"/>
             <a:ext cx="473528" cy="215444"/>
           </a:xfrm>
           <a:prstGeom prst="rect">
@@ -17334,7 +17334,7 @@
         </p:nvSpPr>
         <p:spPr>
           <a:xfrm>
-            <a:off x="10250899" y="6087720"/>
+            <a:off x="10250899" y="6108740"/>
             <a:ext cx="473528" cy="215444"/>
           </a:xfrm>
           <a:prstGeom prst="rect">
@@ -17601,7 +17601,7 @@
         </p:nvSpPr>
         <p:spPr>
           <a:xfrm>
-            <a:off x="8163365" y="3192107"/>
+            <a:off x="8163365" y="3202617"/>
             <a:ext cx="473528" cy="215444"/>
           </a:xfrm>
           <a:prstGeom prst="rect">
@@ -17668,6 +17668,645 @@
                 <a:cs typeface="Arial"/>
               </a:rPr>
               <a:t>      Uses an Istio routing rule here</a:t>
+            </a:r>
+          </a:p>
+        </p:txBody>
+      </p:sp>
+      <p:sp>
+        <p:nvSpPr>
+          <p:cNvPr id="69" name="Rounded Rectangle 68">
+            <a:extLst>
+              <a:ext uri="{FF2B5EF4-FFF2-40B4-BE49-F238E27FC236}">
+                <a16:creationId xmlns:a16="http://schemas.microsoft.com/office/drawing/2014/main" id="{F4549238-D184-3344-923B-2273598BE4D6}"/>
+              </a:ext>
+            </a:extLst>
+          </p:cNvPr>
+          <p:cNvSpPr/>
+          <p:nvPr/>
+        </p:nvSpPr>
+        <p:spPr>
+          <a:xfrm>
+            <a:off x="2270700" y="4944063"/>
+            <a:ext cx="1380994" cy="685800"/>
+          </a:xfrm>
+          <a:prstGeom prst="roundRect">
+            <a:avLst/>
+          </a:prstGeom>
+          <a:solidFill>
+            <a:srgbClr val="00B050"/>
+          </a:solidFill>
+          <a:ln>
+            <a:noFill/>
+          </a:ln>
+          <a:effectLst/>
+        </p:spPr>
+        <p:style>
+          <a:lnRef idx="1">
+            <a:schemeClr val="accent1"/>
+          </a:lnRef>
+          <a:fillRef idx="3">
+            <a:schemeClr val="accent1"/>
+          </a:fillRef>
+          <a:effectRef idx="2">
+            <a:schemeClr val="accent1"/>
+          </a:effectRef>
+          <a:fontRef idx="minor">
+            <a:schemeClr val="lt1"/>
+          </a:fontRef>
+        </p:style>
+        <p:txBody>
+          <a:bodyPr rtlCol="0" anchor="ctr"/>
+          <a:lstStyle/>
+          <a:p>
+            <a:pPr algn="ctr"/>
+            <a:r>
+              <a:rPr lang="en-US" dirty="0"/>
+              <a:t>IBM Event Streams</a:t>
+            </a:r>
+          </a:p>
+        </p:txBody>
+      </p:sp>
+      <p:cxnSp>
+        <p:nvCxnSpPr>
+          <p:cNvPr id="70" name="Straight Connector 69">
+            <a:extLst>
+              <a:ext uri="{FF2B5EF4-FFF2-40B4-BE49-F238E27FC236}">
+                <a16:creationId xmlns:a16="http://schemas.microsoft.com/office/drawing/2014/main" id="{7FB4CCD6-E22A-F84C-882C-F8EEDACBBD67}"/>
+              </a:ext>
+            </a:extLst>
+          </p:cNvPr>
+          <p:cNvCxnSpPr>
+            <a:cxnSpLocks/>
+          </p:cNvCxnSpPr>
+          <p:nvPr/>
+        </p:nvCxnSpPr>
+        <p:spPr>
+          <a:xfrm flipH="1">
+            <a:off x="3592800" y="3771900"/>
+            <a:ext cx="916473" cy="1177129"/>
+          </a:xfrm>
+          <a:prstGeom prst="line">
+            <a:avLst/>
+          </a:prstGeom>
+          <a:ln w="19050">
+            <a:solidFill>
+              <a:schemeClr val="tx1"/>
+            </a:solidFill>
+            <a:tailEnd type="arrow"/>
+          </a:ln>
+        </p:spPr>
+        <p:style>
+          <a:lnRef idx="1">
+            <a:schemeClr val="accent1"/>
+          </a:lnRef>
+          <a:fillRef idx="0">
+            <a:schemeClr val="accent1"/>
+          </a:fillRef>
+          <a:effectRef idx="0">
+            <a:schemeClr val="accent1"/>
+          </a:effectRef>
+          <a:fontRef idx="minor">
+            <a:schemeClr val="tx1"/>
+          </a:fontRef>
+        </p:style>
+      </p:cxnSp>
+      <p:sp>
+        <p:nvSpPr>
+          <p:cNvPr id="71" name="Rounded Rectangle 70">
+            <a:extLst>
+              <a:ext uri="{FF2B5EF4-FFF2-40B4-BE49-F238E27FC236}">
+                <a16:creationId xmlns:a16="http://schemas.microsoft.com/office/drawing/2014/main" id="{FF9AAA7A-4EEB-DF45-8959-9570607788C0}"/>
+              </a:ext>
+            </a:extLst>
+          </p:cNvPr>
+          <p:cNvSpPr/>
+          <p:nvPr/>
+        </p:nvSpPr>
+        <p:spPr>
+          <a:xfrm>
+            <a:off x="2390565" y="5977493"/>
+            <a:ext cx="1143000" cy="685800"/>
+          </a:xfrm>
+          <a:prstGeom prst="roundRect">
+            <a:avLst/>
+          </a:prstGeom>
+          <a:solidFill>
+            <a:schemeClr val="accent1"/>
+          </a:solidFill>
+          <a:ln>
+            <a:noFill/>
+          </a:ln>
+          <a:effectLst/>
+        </p:spPr>
+        <p:style>
+          <a:lnRef idx="1">
+            <a:schemeClr val="accent1"/>
+          </a:lnRef>
+          <a:fillRef idx="3">
+            <a:schemeClr val="accent1"/>
+          </a:fillRef>
+          <a:effectRef idx="2">
+            <a:schemeClr val="accent1"/>
+          </a:effectRef>
+          <a:fontRef idx="minor">
+            <a:schemeClr val="lt1"/>
+          </a:fontRef>
+        </p:style>
+        <p:txBody>
+          <a:bodyPr rtlCol="0" anchor="ctr"/>
+          <a:lstStyle/>
+          <a:p>
+            <a:pPr algn="ctr"/>
+            <a:r>
+              <a:rPr lang="en-US" dirty="0"/>
+              <a:t>Trade History</a:t>
+            </a:r>
+          </a:p>
+        </p:txBody>
+      </p:sp>
+      <p:cxnSp>
+        <p:nvCxnSpPr>
+          <p:cNvPr id="72" name="Straight Connector 71">
+            <a:extLst>
+              <a:ext uri="{FF2B5EF4-FFF2-40B4-BE49-F238E27FC236}">
+                <a16:creationId xmlns:a16="http://schemas.microsoft.com/office/drawing/2014/main" id="{E98C988F-14AB-854D-BC2A-22E936FB1AFA}"/>
+              </a:ext>
+            </a:extLst>
+          </p:cNvPr>
+          <p:cNvCxnSpPr>
+            <a:cxnSpLocks/>
+            <a:stCxn id="69" idx="2"/>
+            <a:endCxn id="71" idx="0"/>
+          </p:cNvCxnSpPr>
+          <p:nvPr/>
+        </p:nvCxnSpPr>
+        <p:spPr>
+          <a:xfrm>
+            <a:off x="2961197" y="5629863"/>
+            <a:ext cx="868" cy="347630"/>
+          </a:xfrm>
+          <a:prstGeom prst="line">
+            <a:avLst/>
+          </a:prstGeom>
+          <a:ln w="19050">
+            <a:solidFill>
+              <a:schemeClr val="tx1"/>
+            </a:solidFill>
+            <a:tailEnd type="arrow"/>
+          </a:ln>
+        </p:spPr>
+        <p:style>
+          <a:lnRef idx="1">
+            <a:schemeClr val="accent1"/>
+          </a:lnRef>
+          <a:fillRef idx="0">
+            <a:schemeClr val="accent1"/>
+          </a:fillRef>
+          <a:effectRef idx="0">
+            <a:schemeClr val="accent1"/>
+          </a:effectRef>
+          <a:fontRef idx="minor">
+            <a:schemeClr val="tx1"/>
+          </a:fontRef>
+        </p:style>
+      </p:cxnSp>
+      <p:sp>
+        <p:nvSpPr>
+          <p:cNvPr id="73" name="Rounded Rectangle 72">
+            <a:extLst>
+              <a:ext uri="{FF2B5EF4-FFF2-40B4-BE49-F238E27FC236}">
+                <a16:creationId xmlns:a16="http://schemas.microsoft.com/office/drawing/2014/main" id="{8D02D35D-39AB-5F48-998E-B1D1E747432B}"/>
+              </a:ext>
+            </a:extLst>
+          </p:cNvPr>
+          <p:cNvSpPr/>
+          <p:nvPr/>
+        </p:nvSpPr>
+        <p:spPr>
+          <a:xfrm>
+            <a:off x="2341116" y="1153043"/>
+            <a:ext cx="1257309" cy="685800"/>
+          </a:xfrm>
+          <a:prstGeom prst="roundRect">
+            <a:avLst/>
+          </a:prstGeom>
+          <a:solidFill>
+            <a:srgbClr val="00B050"/>
+          </a:solidFill>
+          <a:ln>
+            <a:noFill/>
+          </a:ln>
+          <a:effectLst/>
+        </p:spPr>
+        <p:style>
+          <a:lnRef idx="1">
+            <a:schemeClr val="accent1"/>
+          </a:lnRef>
+          <a:fillRef idx="3">
+            <a:schemeClr val="accent1"/>
+          </a:fillRef>
+          <a:effectRef idx="2">
+            <a:schemeClr val="accent1"/>
+          </a:effectRef>
+          <a:fontRef idx="minor">
+            <a:schemeClr val="lt1"/>
+          </a:fontRef>
+        </p:style>
+        <p:txBody>
+          <a:bodyPr rtlCol="0" anchor="ctr"/>
+          <a:lstStyle/>
+          <a:p>
+            <a:pPr algn="ctr"/>
+            <a:r>
+              <a:rPr lang="en-US" dirty="0"/>
+              <a:t>IBM</a:t>
+            </a:r>
+          </a:p>
+          <a:p>
+            <a:pPr algn="ctr"/>
+            <a:r>
+              <a:rPr lang="en-US" dirty="0"/>
+              <a:t>Cloudant</a:t>
+            </a:r>
+          </a:p>
+        </p:txBody>
+      </p:sp>
+      <p:cxnSp>
+        <p:nvCxnSpPr>
+          <p:cNvPr id="76" name="Straight Connector 75">
+            <a:extLst>
+              <a:ext uri="{FF2B5EF4-FFF2-40B4-BE49-F238E27FC236}">
+                <a16:creationId xmlns:a16="http://schemas.microsoft.com/office/drawing/2014/main" id="{DC9F345A-91E0-E541-AB74-C21172FEA3BB}"/>
+              </a:ext>
+            </a:extLst>
+          </p:cNvPr>
+          <p:cNvCxnSpPr>
+            <a:cxnSpLocks/>
+            <a:stCxn id="71" idx="1"/>
+          </p:cNvCxnSpPr>
+          <p:nvPr/>
+        </p:nvCxnSpPr>
+        <p:spPr>
+          <a:xfrm flipH="1">
+            <a:off x="2080766" y="6320393"/>
+            <a:ext cx="309799" cy="0"/>
+          </a:xfrm>
+          <a:prstGeom prst="line">
+            <a:avLst/>
+          </a:prstGeom>
+          <a:ln w="19050">
+            <a:solidFill>
+              <a:schemeClr val="tx1"/>
+            </a:solidFill>
+            <a:tailEnd type="none"/>
+          </a:ln>
+        </p:spPr>
+        <p:style>
+          <a:lnRef idx="1">
+            <a:schemeClr val="accent1"/>
+          </a:lnRef>
+          <a:fillRef idx="0">
+            <a:schemeClr val="accent1"/>
+          </a:fillRef>
+          <a:effectRef idx="0">
+            <a:schemeClr val="accent1"/>
+          </a:effectRef>
+          <a:fontRef idx="minor">
+            <a:schemeClr val="tx1"/>
+          </a:fontRef>
+        </p:style>
+      </p:cxnSp>
+      <p:cxnSp>
+        <p:nvCxnSpPr>
+          <p:cNvPr id="79" name="Straight Connector 78">
+            <a:extLst>
+              <a:ext uri="{FF2B5EF4-FFF2-40B4-BE49-F238E27FC236}">
+                <a16:creationId xmlns:a16="http://schemas.microsoft.com/office/drawing/2014/main" id="{349B09E2-EF70-5C44-83FE-C19FC0612112}"/>
+              </a:ext>
+            </a:extLst>
+          </p:cNvPr>
+          <p:cNvCxnSpPr>
+            <a:cxnSpLocks/>
+          </p:cNvCxnSpPr>
+          <p:nvPr/>
+        </p:nvCxnSpPr>
+        <p:spPr>
+          <a:xfrm flipH="1">
+            <a:off x="2080766" y="1495943"/>
+            <a:ext cx="59848" cy="4819033"/>
+          </a:xfrm>
+          <a:prstGeom prst="line">
+            <a:avLst/>
+          </a:prstGeom>
+          <a:ln w="19050">
+            <a:solidFill>
+              <a:schemeClr val="tx1"/>
+            </a:solidFill>
+            <a:tailEnd type="none"/>
+          </a:ln>
+        </p:spPr>
+        <p:style>
+          <a:lnRef idx="1">
+            <a:schemeClr val="accent1"/>
+          </a:lnRef>
+          <a:fillRef idx="0">
+            <a:schemeClr val="accent1"/>
+          </a:fillRef>
+          <a:effectRef idx="0">
+            <a:schemeClr val="accent1"/>
+          </a:effectRef>
+          <a:fontRef idx="minor">
+            <a:schemeClr val="tx1"/>
+          </a:fontRef>
+        </p:style>
+      </p:cxnSp>
+      <p:cxnSp>
+        <p:nvCxnSpPr>
+          <p:cNvPr id="80" name="Straight Connector 79">
+            <a:extLst>
+              <a:ext uri="{FF2B5EF4-FFF2-40B4-BE49-F238E27FC236}">
+                <a16:creationId xmlns:a16="http://schemas.microsoft.com/office/drawing/2014/main" id="{B1CAD3B5-51CB-594A-B21B-55D4AB420DCD}"/>
+              </a:ext>
+            </a:extLst>
+          </p:cNvPr>
+          <p:cNvCxnSpPr>
+            <a:cxnSpLocks/>
+            <a:endCxn id="73" idx="1"/>
+          </p:cNvCxnSpPr>
+          <p:nvPr/>
+        </p:nvCxnSpPr>
+        <p:spPr>
+          <a:xfrm>
+            <a:off x="2120994" y="1495943"/>
+            <a:ext cx="220122" cy="0"/>
+          </a:xfrm>
+          <a:prstGeom prst="line">
+            <a:avLst/>
+          </a:prstGeom>
+          <a:ln w="19050">
+            <a:solidFill>
+              <a:schemeClr val="tx1"/>
+            </a:solidFill>
+            <a:tailEnd type="arrow"/>
+          </a:ln>
+        </p:spPr>
+        <p:style>
+          <a:lnRef idx="1">
+            <a:schemeClr val="accent1"/>
+          </a:lnRef>
+          <a:fillRef idx="0">
+            <a:schemeClr val="accent1"/>
+          </a:fillRef>
+          <a:effectRef idx="0">
+            <a:schemeClr val="accent1"/>
+          </a:effectRef>
+          <a:fontRef idx="minor">
+            <a:schemeClr val="tx1"/>
+          </a:fontRef>
+        </p:style>
+      </p:cxnSp>
+      <p:sp>
+        <p:nvSpPr>
+          <p:cNvPr id="82" name="TextBox 81">
+            <a:extLst>
+              <a:ext uri="{FF2B5EF4-FFF2-40B4-BE49-F238E27FC236}">
+                <a16:creationId xmlns:a16="http://schemas.microsoft.com/office/drawing/2014/main" id="{AAFC9165-46E3-4B4B-9E81-A7744AE6857C}"/>
+              </a:ext>
+            </a:extLst>
+          </p:cNvPr>
+          <p:cNvSpPr txBox="1"/>
+          <p:nvPr/>
+        </p:nvSpPr>
+        <p:spPr>
+          <a:xfrm>
+            <a:off x="3027352" y="5767022"/>
+            <a:ext cx="473528" cy="215444"/>
+          </a:xfrm>
+          <a:prstGeom prst="rect">
+            <a:avLst/>
+          </a:prstGeom>
+          <a:noFill/>
+          <a:ln>
+            <a:noFill/>
+          </a:ln>
+        </p:spPr>
+        <p:txBody>
+          <a:bodyPr wrap="none" lIns="0" tIns="0" rIns="0" bIns="0" rtlCol="0">
+            <a:spAutoFit/>
+          </a:bodyPr>
+          <a:lstStyle/>
+          <a:p>
+            <a:r>
+              <a:rPr lang="en-US" sz="1400" i="1" kern="0" spc="-30" dirty="0">
+                <a:latin typeface="Arial"/>
+                <a:cs typeface="Arial"/>
+              </a:rPr>
+              <a:t>POST</a:t>
+            </a:r>
+          </a:p>
+        </p:txBody>
+      </p:sp>
+      <p:sp>
+        <p:nvSpPr>
+          <p:cNvPr id="83" name="TextBox 82">
+            <a:extLst>
+              <a:ext uri="{FF2B5EF4-FFF2-40B4-BE49-F238E27FC236}">
+                <a16:creationId xmlns:a16="http://schemas.microsoft.com/office/drawing/2014/main" id="{C08C2D88-4A4C-B344-9544-DC7A4EC902DD}"/>
+              </a:ext>
+            </a:extLst>
+          </p:cNvPr>
+          <p:cNvSpPr txBox="1"/>
+          <p:nvPr/>
+        </p:nvSpPr>
+        <p:spPr>
+          <a:xfrm>
+            <a:off x="3150129" y="4724582"/>
+            <a:ext cx="439223" cy="215444"/>
+          </a:xfrm>
+          <a:prstGeom prst="rect">
+            <a:avLst/>
+          </a:prstGeom>
+          <a:noFill/>
+          <a:ln>
+            <a:noFill/>
+          </a:ln>
+        </p:spPr>
+        <p:txBody>
+          <a:bodyPr wrap="none" lIns="0" tIns="0" rIns="0" bIns="0" rtlCol="0">
+            <a:spAutoFit/>
+          </a:bodyPr>
+          <a:lstStyle/>
+          <a:p>
+            <a:r>
+              <a:rPr lang="en-US" sz="1400" i="1" kern="0" spc="-30" dirty="0">
+                <a:latin typeface="Arial"/>
+                <a:cs typeface="Arial"/>
+              </a:rPr>
+              <a:t>Kafka</a:t>
+            </a:r>
+          </a:p>
+        </p:txBody>
+      </p:sp>
+      <p:sp>
+        <p:nvSpPr>
+          <p:cNvPr id="90" name="TextBox 89">
+            <a:extLst>
+              <a:ext uri="{FF2B5EF4-FFF2-40B4-BE49-F238E27FC236}">
+                <a16:creationId xmlns:a16="http://schemas.microsoft.com/office/drawing/2014/main" id="{C5F3E515-6D28-2349-971F-4D8FF9AFB2FC}"/>
+              </a:ext>
+            </a:extLst>
+          </p:cNvPr>
+          <p:cNvSpPr txBox="1"/>
+          <p:nvPr/>
+        </p:nvSpPr>
+        <p:spPr>
+          <a:xfrm>
+            <a:off x="3725352" y="4724582"/>
+            <a:ext cx="402995" cy="215444"/>
+          </a:xfrm>
+          <a:prstGeom prst="rect">
+            <a:avLst/>
+          </a:prstGeom>
+          <a:noFill/>
+          <a:ln>
+            <a:noFill/>
+          </a:ln>
+        </p:spPr>
+        <p:txBody>
+          <a:bodyPr wrap="none" lIns="0" tIns="0" rIns="0" bIns="0" rtlCol="0">
+            <a:spAutoFit/>
+          </a:bodyPr>
+          <a:lstStyle/>
+          <a:p>
+            <a:r>
+              <a:rPr lang="en-US" sz="1400" i="1" kern="0" spc="-30" dirty="0">
+                <a:latin typeface="Arial"/>
+                <a:cs typeface="Arial"/>
+              </a:rPr>
+              <a:t>Send</a:t>
+            </a:r>
+          </a:p>
+        </p:txBody>
+      </p:sp>
+      <p:sp>
+        <p:nvSpPr>
+          <p:cNvPr id="91" name="TextBox 90">
+            <a:extLst>
+              <a:ext uri="{FF2B5EF4-FFF2-40B4-BE49-F238E27FC236}">
+                <a16:creationId xmlns:a16="http://schemas.microsoft.com/office/drawing/2014/main" id="{74E68E03-9F05-6E4E-A556-44A60E00DCD1}"/>
+              </a:ext>
+            </a:extLst>
+          </p:cNvPr>
+          <p:cNvSpPr txBox="1"/>
+          <p:nvPr/>
+        </p:nvSpPr>
+        <p:spPr>
+          <a:xfrm>
+            <a:off x="1828595" y="1257538"/>
+            <a:ext cx="473528" cy="215444"/>
+          </a:xfrm>
+          <a:prstGeom prst="rect">
+            <a:avLst/>
+          </a:prstGeom>
+          <a:noFill/>
+          <a:ln>
+            <a:noFill/>
+          </a:ln>
+        </p:spPr>
+        <p:txBody>
+          <a:bodyPr wrap="none" lIns="0" tIns="0" rIns="0" bIns="0" rtlCol="0">
+            <a:spAutoFit/>
+          </a:bodyPr>
+          <a:lstStyle/>
+          <a:p>
+            <a:r>
+              <a:rPr lang="en-US" sz="1400" i="1" kern="0" spc="-30" dirty="0">
+                <a:latin typeface="Arial"/>
+                <a:cs typeface="Arial"/>
+              </a:rPr>
+              <a:t>POST</a:t>
+            </a:r>
+          </a:p>
+        </p:txBody>
+      </p:sp>
+      <p:sp>
+        <p:nvSpPr>
+          <p:cNvPr id="92" name="TextBox 91">
+            <a:extLst>
+              <a:ext uri="{FF2B5EF4-FFF2-40B4-BE49-F238E27FC236}">
+                <a16:creationId xmlns:a16="http://schemas.microsoft.com/office/drawing/2014/main" id="{31FF369E-F0C9-AC44-9E87-B94C5057962C}"/>
+              </a:ext>
+            </a:extLst>
+          </p:cNvPr>
+          <p:cNvSpPr txBox="1"/>
+          <p:nvPr/>
+        </p:nvSpPr>
+        <p:spPr>
+          <a:xfrm>
+            <a:off x="6501944" y="1742543"/>
+            <a:ext cx="399148" cy="215444"/>
+          </a:xfrm>
+          <a:prstGeom prst="rect">
+            <a:avLst/>
+          </a:prstGeom>
+          <a:noFill/>
+          <a:ln>
+            <a:noFill/>
+          </a:ln>
+        </p:spPr>
+        <p:txBody>
+          <a:bodyPr wrap="none" lIns="0" tIns="0" rIns="0" bIns="0" rtlCol="0">
+            <a:spAutoFit/>
+          </a:bodyPr>
+          <a:lstStyle/>
+          <a:p>
+            <a:r>
+              <a:rPr lang="en-US" sz="1400" i="1" kern="0" spc="-30" dirty="0">
+                <a:latin typeface="Arial"/>
+                <a:cs typeface="Arial"/>
+              </a:rPr>
+              <a:t>Jedis</a:t>
+            </a:r>
+          </a:p>
+        </p:txBody>
+      </p:sp>
+      <p:sp>
+        <p:nvSpPr>
+          <p:cNvPr id="93" name="TextBox 92">
+            <a:extLst>
+              <a:ext uri="{FF2B5EF4-FFF2-40B4-BE49-F238E27FC236}">
+                <a16:creationId xmlns:a16="http://schemas.microsoft.com/office/drawing/2014/main" id="{6317A6A6-BF4B-7C42-9D29-B8308EF81A4B}"/>
+              </a:ext>
+            </a:extLst>
+          </p:cNvPr>
+          <p:cNvSpPr txBox="1"/>
+          <p:nvPr/>
+        </p:nvSpPr>
+        <p:spPr>
+          <a:xfrm>
+            <a:off x="10035125" y="6392126"/>
+            <a:ext cx="691536" cy="215444"/>
+          </a:xfrm>
+          <a:prstGeom prst="rect">
+            <a:avLst/>
+          </a:prstGeom>
+          <a:noFill/>
+          <a:ln>
+            <a:noFill/>
+          </a:ln>
+        </p:spPr>
+        <p:txBody>
+          <a:bodyPr wrap="none" lIns="0" tIns="0" rIns="0" bIns="0" rtlCol="0">
+            <a:spAutoFit/>
+          </a:bodyPr>
+          <a:lstStyle/>
+          <a:p>
+            <a:r>
+              <a:rPr lang="en-US" sz="1400" i="1" kern="0" spc="-30" dirty="0">
+                <a:latin typeface="Arial"/>
+                <a:cs typeface="Arial"/>
+              </a:rPr>
+              <a:t>Twitter4J</a:t>
             </a:r>
           </a:p>
         </p:txBody>

</xml_diff>

<commit_message>
Changed Cloudant to Mongo
</commit_message>
<xml_diff>
--- a/lab/Stock Trader Sample - Diagram.pptx
+++ b/lab/Stock Trader Sample - Diagram.pptx
@@ -228,7 +228,7 @@
             <a:fld id="{D0752B3F-16DD-4F19-ACDD-F2069BC5BD4E}" type="datetimeFigureOut">
               <a:rPr lang="en-US" smtClean="0"/>
               <a:pPr/>
-              <a:t>12/3/18</a:t>
+              <a:t>12/11/18</a:t>
             </a:fld>
             <a:endParaRPr lang="en-US"/>
           </a:p>
@@ -395,7 +395,7 @@
             <a:fld id="{9FA6D163-A0F5-498D-A72B-50DE16555140}" type="datetimeFigureOut">
               <a:rPr lang="en-US" smtClean="0"/>
               <a:pPr/>
-              <a:t>12/3/18</a:t>
+              <a:t>12/11/18</a:t>
             </a:fld>
             <a:endParaRPr lang="en-US"/>
           </a:p>
@@ -15096,7 +15096,7 @@
         </p:nvSpPr>
         <p:spPr>
           <a:xfrm>
-            <a:off x="1828595" y="777608"/>
+            <a:off x="1828595" y="767098"/>
             <a:ext cx="5969483" cy="6045200"/>
           </a:xfrm>
           <a:prstGeom prst="rect">
@@ -17919,14 +17919,7 @@
             <a:pPr algn="ctr"/>
             <a:r>
               <a:rPr lang="en-US" dirty="0"/>
-              <a:t>IBM</a:t>
-            </a:r>
-          </a:p>
-          <a:p>
-            <a:pPr algn="ctr"/>
-            <a:r>
-              <a:rPr lang="en-US" dirty="0"/>
-              <a:t>Cloudant</a:t>
+              <a:t>Mongo</a:t>
             </a:r>
           </a:p>
         </p:txBody>
@@ -18079,8 +18072,8 @@
         </p:nvSpPr>
         <p:spPr>
           <a:xfrm>
-            <a:off x="3027352" y="5767022"/>
-            <a:ext cx="473528" cy="215444"/>
+            <a:off x="3027352" y="5777532"/>
+            <a:ext cx="620683" cy="215444"/>
           </a:xfrm>
           <a:prstGeom prst="rect">
             <a:avLst/>
@@ -18101,7 +18094,7 @@
                 <a:latin typeface="Arial"/>
                 <a:cs typeface="Arial"/>
               </a:rPr>
-              <a:t>POST</a:t>
+              <a:t>Receive</a:t>
             </a:r>
           </a:p>
         </p:txBody>
@@ -18307,6 +18300,47 @@
                 <a:cs typeface="Arial"/>
               </a:rPr>
               <a:t>Twitter4J</a:t>
+            </a:r>
+          </a:p>
+        </p:txBody>
+      </p:sp>
+      <p:sp>
+        <p:nvSpPr>
+          <p:cNvPr id="94" name="TextBox 93">
+            <a:extLst>
+              <a:ext uri="{FF2B5EF4-FFF2-40B4-BE49-F238E27FC236}">
+                <a16:creationId xmlns:a16="http://schemas.microsoft.com/office/drawing/2014/main" id="{93182461-58C8-BB45-8E2E-218F038A2342}"/>
+              </a:ext>
+            </a:extLst>
+          </p:cNvPr>
+          <p:cNvSpPr txBox="1"/>
+          <p:nvPr/>
+        </p:nvSpPr>
+        <p:spPr>
+          <a:xfrm>
+            <a:off x="2461157" y="5772262"/>
+            <a:ext cx="439223" cy="215444"/>
+          </a:xfrm>
+          <a:prstGeom prst="rect">
+            <a:avLst/>
+          </a:prstGeom>
+          <a:noFill/>
+          <a:ln>
+            <a:noFill/>
+          </a:ln>
+        </p:spPr>
+        <p:txBody>
+          <a:bodyPr wrap="none" lIns="0" tIns="0" rIns="0" bIns="0" rtlCol="0">
+            <a:spAutoFit/>
+          </a:bodyPr>
+          <a:lstStyle/>
+          <a:p>
+            <a:r>
+              <a:rPr lang="en-US" sz="1400" i="1" kern="0" spc="-30" dirty="0">
+                <a:latin typeface="Arial"/>
+                <a:cs typeface="Arial"/>
+              </a:rPr>
+              <a:t>Kafka</a:t>
             </a:r>
           </a:p>
         </p:txBody>

</xml_diff>

<commit_message>
Added looper/loopctl to the diagram
</commit_message>
<xml_diff>
--- a/lab/Stock Trader Sample - Diagram.pptx
+++ b/lab/Stock Trader Sample - Diagram.pptx
@@ -228,7 +228,7 @@
             <a:fld id="{D0752B3F-16DD-4F19-ACDD-F2069BC5BD4E}" type="datetimeFigureOut">
               <a:rPr lang="en-US" smtClean="0"/>
               <a:pPr/>
-              <a:t>12/11/18</a:t>
+              <a:t>12/19/18</a:t>
             </a:fld>
             <a:endParaRPr lang="en-US"/>
           </a:p>
@@ -395,7 +395,7 @@
             <a:fld id="{9FA6D163-A0F5-498D-A72B-50DE16555140}" type="datetimeFigureOut">
               <a:rPr lang="en-US" smtClean="0"/>
               <a:pPr/>
-              <a:t>12/11/18</a:t>
+              <a:t>12/19/18</a:t>
             </a:fld>
             <a:endParaRPr lang="en-US"/>
           </a:p>
@@ -4911,7 +4911,7 @@
           </a:ln>
           <a:extLst>
             <a:ext uri="{C572A759-6A51-4108-AA02-DFA0A04FC94B}">
-              <ma14:wrappingTextBoxFlag xmlns:ma14="http://schemas.microsoft.com/office/mac/drawingml/2011/main" xmlns="" val="1"/>
+              <ma14:wrappingTextBoxFlag xmlns="" xmlns:ma14="http://schemas.microsoft.com/office/mac/drawingml/2011/main" val="1"/>
             </a:ext>
           </a:extLst>
         </p:spPr>
@@ -5401,17 +5401,17 @@
           </a:ln>
           <a:extLst>
             <a:ext uri="{FAA26D3D-D897-4be2-8F04-BA451C77F1D7}">
-              <ma14:placeholderFlag xmlns="" xmlns:ma14="http://schemas.microsoft.com/office/mac/drawingml/2011/main" val="1"/>
+              <ma14:placeholderFlag xmlns:ma14="http://schemas.microsoft.com/office/mac/drawingml/2011/main" xmlns="" val="1"/>
             </a:ext>
             <a:ext uri="{909E8E84-426E-40dd-AFC4-6F175D3DCCD1}">
-              <a14:hiddenFill xmlns="" xmlns:a14="http://schemas.microsoft.com/office/drawing/2010/main">
+              <a14:hiddenFill xmlns:a14="http://schemas.microsoft.com/office/drawing/2010/main" xmlns="">
                 <a:solidFill>
                   <a:srgbClr val="FFFFFF"/>
                 </a:solidFill>
               </a14:hiddenFill>
             </a:ext>
             <a:ext uri="{91240B29-F687-4f45-9708-019B960494DF}">
-              <a14:hiddenLine xmlns="" xmlns:a14="http://schemas.microsoft.com/office/drawing/2010/main" w="9525">
+              <a14:hiddenLine xmlns:a14="http://schemas.microsoft.com/office/drawing/2010/main" xmlns="" w="9525">
                 <a:solidFill>
                   <a:srgbClr val="000000"/>
                 </a:solidFill>
@@ -5947,17 +5947,17 @@
           </a:ln>
           <a:extLst>
             <a:ext uri="{FAA26D3D-D897-4be2-8F04-BA451C77F1D7}">
-              <ma14:placeholderFlag xmlns="" xmlns:ma14="http://schemas.microsoft.com/office/mac/drawingml/2011/main" val="1"/>
+              <ma14:placeholderFlag xmlns:ma14="http://schemas.microsoft.com/office/mac/drawingml/2011/main" xmlns="" val="1"/>
             </a:ext>
             <a:ext uri="{909E8E84-426E-40dd-AFC4-6F175D3DCCD1}">
-              <a14:hiddenFill xmlns="" xmlns:a14="http://schemas.microsoft.com/office/drawing/2010/main">
+              <a14:hiddenFill xmlns:a14="http://schemas.microsoft.com/office/drawing/2010/main" xmlns="">
                 <a:solidFill>
                   <a:srgbClr val="FFFFFF"/>
                 </a:solidFill>
               </a14:hiddenFill>
             </a:ext>
             <a:ext uri="{91240B29-F687-4f45-9708-019B960494DF}">
-              <a14:hiddenLine xmlns="" xmlns:a14="http://schemas.microsoft.com/office/drawing/2010/main" w="9525">
+              <a14:hiddenLine xmlns:a14="http://schemas.microsoft.com/office/drawing/2010/main" xmlns="" w="9525">
                 <a:solidFill>
                   <a:srgbClr val="000000"/>
                 </a:solidFill>
@@ -6432,17 +6432,17 @@
           </a:ln>
           <a:extLst>
             <a:ext uri="{FAA26D3D-D897-4be2-8F04-BA451C77F1D7}">
-              <ma14:placeholderFlag xmlns="" xmlns:ma14="http://schemas.microsoft.com/office/mac/drawingml/2011/main" val="1"/>
+              <ma14:placeholderFlag xmlns:ma14="http://schemas.microsoft.com/office/mac/drawingml/2011/main" xmlns="" val="1"/>
             </a:ext>
             <a:ext uri="{909E8E84-426E-40dd-AFC4-6F175D3DCCD1}">
-              <a14:hiddenFill xmlns="" xmlns:a14="http://schemas.microsoft.com/office/drawing/2010/main">
+              <a14:hiddenFill xmlns:a14="http://schemas.microsoft.com/office/drawing/2010/main" xmlns="">
                 <a:solidFill>
                   <a:srgbClr val="FFFFFF"/>
                 </a:solidFill>
               </a14:hiddenFill>
             </a:ext>
             <a:ext uri="{91240B29-F687-4f45-9708-019B960494DF}">
-              <a14:hiddenLine xmlns="" xmlns:a14="http://schemas.microsoft.com/office/drawing/2010/main" w="9525">
+              <a14:hiddenLine xmlns:a14="http://schemas.microsoft.com/office/drawing/2010/main" xmlns="" w="9525">
                 <a:solidFill>
                   <a:srgbClr val="000000"/>
                 </a:solidFill>
@@ -6547,17 +6547,17 @@
           </a:ln>
           <a:extLst>
             <a:ext uri="{FAA26D3D-D897-4be2-8F04-BA451C77F1D7}">
-              <ma14:placeholderFlag xmlns="" xmlns:ma14="http://schemas.microsoft.com/office/mac/drawingml/2011/main" val="1"/>
+              <ma14:placeholderFlag xmlns:ma14="http://schemas.microsoft.com/office/mac/drawingml/2011/main" xmlns="" val="1"/>
             </a:ext>
             <a:ext uri="{909E8E84-426E-40dd-AFC4-6F175D3DCCD1}">
-              <a14:hiddenFill xmlns="" xmlns:a14="http://schemas.microsoft.com/office/drawing/2010/main">
+              <a14:hiddenFill xmlns:a14="http://schemas.microsoft.com/office/drawing/2010/main" xmlns="">
                 <a:solidFill>
                   <a:srgbClr val="FFFFFF"/>
                 </a:solidFill>
               </a14:hiddenFill>
             </a:ext>
             <a:ext uri="{91240B29-F687-4f45-9708-019B960494DF}">
-              <a14:hiddenLine xmlns="" xmlns:a14="http://schemas.microsoft.com/office/drawing/2010/main" w="9525">
+              <a14:hiddenLine xmlns:a14="http://schemas.microsoft.com/office/drawing/2010/main" xmlns="" w="9525">
                 <a:solidFill>
                   <a:srgbClr val="000000"/>
                 </a:solidFill>
@@ -7779,17 +7779,17 @@
           </a:ln>
           <a:extLst>
             <a:ext uri="{FAA26D3D-D897-4be2-8F04-BA451C77F1D7}">
-              <ma14:placeholderFlag xmlns="" xmlns:ma14="http://schemas.microsoft.com/office/mac/drawingml/2011/main" val="1"/>
+              <ma14:placeholderFlag xmlns:ma14="http://schemas.microsoft.com/office/mac/drawingml/2011/main" xmlns="" val="1"/>
             </a:ext>
             <a:ext uri="{909E8E84-426E-40dd-AFC4-6F175D3DCCD1}">
-              <a14:hiddenFill xmlns="" xmlns:a14="http://schemas.microsoft.com/office/drawing/2010/main">
+              <a14:hiddenFill xmlns:a14="http://schemas.microsoft.com/office/drawing/2010/main" xmlns="">
                 <a:solidFill>
                   <a:srgbClr val="FFFFFF"/>
                 </a:solidFill>
               </a14:hiddenFill>
             </a:ext>
             <a:ext uri="{91240B29-F687-4f45-9708-019B960494DF}">
-              <a14:hiddenLine xmlns="" xmlns:a14="http://schemas.microsoft.com/office/drawing/2010/main" w="9525">
+              <a14:hiddenLine xmlns:a14="http://schemas.microsoft.com/office/drawing/2010/main" xmlns="" w="9525">
                 <a:solidFill>
                   <a:srgbClr val="000000"/>
                 </a:solidFill>
@@ -8682,17 +8682,17 @@
           </a:ln>
           <a:extLst>
             <a:ext uri="{FAA26D3D-D897-4be2-8F04-BA451C77F1D7}">
-              <ma14:placeholderFlag xmlns="" xmlns:ma14="http://schemas.microsoft.com/office/mac/drawingml/2011/main" val="1"/>
+              <ma14:placeholderFlag xmlns:ma14="http://schemas.microsoft.com/office/mac/drawingml/2011/main" xmlns="" val="1"/>
             </a:ext>
             <a:ext uri="{909E8E84-426E-40dd-AFC4-6F175D3DCCD1}">
-              <a14:hiddenFill xmlns="" xmlns:a14="http://schemas.microsoft.com/office/drawing/2010/main">
+              <a14:hiddenFill xmlns:a14="http://schemas.microsoft.com/office/drawing/2010/main" xmlns="">
                 <a:solidFill>
                   <a:srgbClr val="FFFFFF"/>
                 </a:solidFill>
               </a14:hiddenFill>
             </a:ext>
             <a:ext uri="{91240B29-F687-4f45-9708-019B960494DF}">
-              <a14:hiddenLine xmlns="" xmlns:a14="http://schemas.microsoft.com/office/drawing/2010/main" w="9525">
+              <a14:hiddenLine xmlns:a14="http://schemas.microsoft.com/office/drawing/2010/main" xmlns="" w="9525">
                 <a:solidFill>
                   <a:srgbClr val="000000"/>
                 </a:solidFill>
@@ -9411,17 +9411,17 @@
           </a:ln>
           <a:extLst>
             <a:ext uri="{FAA26D3D-D897-4be2-8F04-BA451C77F1D7}">
-              <ma14:placeholderFlag xmlns="" xmlns:ma14="http://schemas.microsoft.com/office/mac/drawingml/2011/main" val="1"/>
+              <ma14:placeholderFlag xmlns:ma14="http://schemas.microsoft.com/office/mac/drawingml/2011/main" xmlns="" val="1"/>
             </a:ext>
             <a:ext uri="{909E8E84-426E-40dd-AFC4-6F175D3DCCD1}">
-              <a14:hiddenFill xmlns="" xmlns:a14="http://schemas.microsoft.com/office/drawing/2010/main">
+              <a14:hiddenFill xmlns:a14="http://schemas.microsoft.com/office/drawing/2010/main" xmlns="">
                 <a:solidFill>
                   <a:srgbClr val="FFFFFF"/>
                 </a:solidFill>
               </a14:hiddenFill>
             </a:ext>
             <a:ext uri="{91240B29-F687-4f45-9708-019B960494DF}">
-              <a14:hiddenLine xmlns="" xmlns:a14="http://schemas.microsoft.com/office/drawing/2010/main" w="9525">
+              <a14:hiddenLine xmlns:a14="http://schemas.microsoft.com/office/drawing/2010/main" xmlns="" w="9525">
                 <a:solidFill>
                   <a:srgbClr val="000000"/>
                 </a:solidFill>
@@ -9896,17 +9896,17 @@
           </a:ln>
           <a:extLst>
             <a:ext uri="{FAA26D3D-D897-4be2-8F04-BA451C77F1D7}">
-              <ma14:placeholderFlag xmlns="" xmlns:ma14="http://schemas.microsoft.com/office/mac/drawingml/2011/main" val="1"/>
+              <ma14:placeholderFlag xmlns:ma14="http://schemas.microsoft.com/office/mac/drawingml/2011/main" xmlns="" val="1"/>
             </a:ext>
             <a:ext uri="{909E8E84-426E-40dd-AFC4-6F175D3DCCD1}">
-              <a14:hiddenFill xmlns="" xmlns:a14="http://schemas.microsoft.com/office/drawing/2010/main">
+              <a14:hiddenFill xmlns:a14="http://schemas.microsoft.com/office/drawing/2010/main" xmlns="">
                 <a:solidFill>
                   <a:srgbClr val="FFFFFF"/>
                 </a:solidFill>
               </a14:hiddenFill>
             </a:ext>
             <a:ext uri="{91240B29-F687-4f45-9708-019B960494DF}">
-              <a14:hiddenLine xmlns="" xmlns:a14="http://schemas.microsoft.com/office/drawing/2010/main" w="9525">
+              <a14:hiddenLine xmlns:a14="http://schemas.microsoft.com/office/drawing/2010/main" xmlns="" w="9525">
                 <a:solidFill>
                   <a:srgbClr val="000000"/>
                 </a:solidFill>
@@ -10011,17 +10011,17 @@
           </a:ln>
           <a:extLst>
             <a:ext uri="{FAA26D3D-D897-4be2-8F04-BA451C77F1D7}">
-              <ma14:placeholderFlag xmlns="" xmlns:ma14="http://schemas.microsoft.com/office/mac/drawingml/2011/main" val="1"/>
+              <ma14:placeholderFlag xmlns:ma14="http://schemas.microsoft.com/office/mac/drawingml/2011/main" xmlns="" val="1"/>
             </a:ext>
             <a:ext uri="{909E8E84-426E-40dd-AFC4-6F175D3DCCD1}">
-              <a14:hiddenFill xmlns="" xmlns:a14="http://schemas.microsoft.com/office/drawing/2010/main">
+              <a14:hiddenFill xmlns:a14="http://schemas.microsoft.com/office/drawing/2010/main" xmlns="">
                 <a:solidFill>
                   <a:srgbClr val="FFFFFF"/>
                 </a:solidFill>
               </a14:hiddenFill>
             </a:ext>
             <a:ext uri="{91240B29-F687-4f45-9708-019B960494DF}">
-              <a14:hiddenLine xmlns="" xmlns:a14="http://schemas.microsoft.com/office/drawing/2010/main" w="9525">
+              <a14:hiddenLine xmlns:a14="http://schemas.microsoft.com/office/drawing/2010/main" xmlns="" w="9525">
                 <a:solidFill>
                   <a:srgbClr val="000000"/>
                 </a:solidFill>
@@ -10967,17 +10967,17 @@
           </a:ln>
           <a:extLst>
             <a:ext uri="{FAA26D3D-D897-4be2-8F04-BA451C77F1D7}">
-              <ma14:placeholderFlag xmlns="" xmlns:ma14="http://schemas.microsoft.com/office/mac/drawingml/2011/main" val="1"/>
+              <ma14:placeholderFlag xmlns:ma14="http://schemas.microsoft.com/office/mac/drawingml/2011/main" xmlns="" val="1"/>
             </a:ext>
             <a:ext uri="{909E8E84-426E-40dd-AFC4-6F175D3DCCD1}">
-              <a14:hiddenFill xmlns="" xmlns:a14="http://schemas.microsoft.com/office/drawing/2010/main">
+              <a14:hiddenFill xmlns:a14="http://schemas.microsoft.com/office/drawing/2010/main" xmlns="">
                 <a:solidFill>
                   <a:srgbClr val="FFFFFF"/>
                 </a:solidFill>
               </a14:hiddenFill>
             </a:ext>
             <a:ext uri="{91240B29-F687-4f45-9708-019B960494DF}">
-              <a14:hiddenLine xmlns="" xmlns:a14="http://schemas.microsoft.com/office/drawing/2010/main" w="9525">
+              <a14:hiddenLine xmlns:a14="http://schemas.microsoft.com/office/drawing/2010/main" xmlns="" w="9525">
                 <a:solidFill>
                   <a:srgbClr val="000000"/>
                 </a:solidFill>
@@ -13325,17 +13325,17 @@
           </a:ln>
           <a:extLst>
             <a:ext uri="{FAA26D3D-D897-4be2-8F04-BA451C77F1D7}">
-              <ma14:placeholderFlag xmlns="" xmlns:ma14="http://schemas.microsoft.com/office/mac/drawingml/2011/main" val="1"/>
+              <ma14:placeholderFlag xmlns:ma14="http://schemas.microsoft.com/office/mac/drawingml/2011/main" xmlns="" val="1"/>
             </a:ext>
             <a:ext uri="{909E8E84-426E-40dd-AFC4-6F175D3DCCD1}">
-              <a14:hiddenFill xmlns="" xmlns:a14="http://schemas.microsoft.com/office/drawing/2010/main">
+              <a14:hiddenFill xmlns:a14="http://schemas.microsoft.com/office/drawing/2010/main" xmlns="">
                 <a:solidFill>
                   <a:srgbClr val="FFFFFF"/>
                 </a:solidFill>
               </a14:hiddenFill>
             </a:ext>
             <a:ext uri="{91240B29-F687-4f45-9708-019B960494DF}">
-              <a14:hiddenLine xmlns="" xmlns:a14="http://schemas.microsoft.com/office/drawing/2010/main" w="9525">
+              <a14:hiddenLine xmlns:a14="http://schemas.microsoft.com/office/drawing/2010/main" xmlns="" w="9525">
                 <a:solidFill>
                   <a:srgbClr val="000000"/>
                 </a:solidFill>
@@ -13419,14 +13419,14 @@
           </a:ln>
           <a:extLst>
             <a:ext uri="{909E8E84-426E-40dd-AFC4-6F175D3DCCD1}">
-              <a14:hiddenFill xmlns="" xmlns:a14="http://schemas.microsoft.com/office/drawing/2010/main">
+              <a14:hiddenFill xmlns:a14="http://schemas.microsoft.com/office/drawing/2010/main" xmlns="">
                 <a:solidFill>
                   <a:srgbClr val="FFFFFF"/>
                 </a:solidFill>
               </a14:hiddenFill>
             </a:ext>
             <a:ext uri="{91240B29-F687-4f45-9708-019B960494DF}">
-              <a14:hiddenLine xmlns="" xmlns:a14="http://schemas.microsoft.com/office/drawing/2010/main" w="9525">
+              <a14:hiddenLine xmlns:a14="http://schemas.microsoft.com/office/drawing/2010/main" xmlns="" w="9525">
                 <a:solidFill>
                   <a:srgbClr val="000000"/>
                 </a:solidFill>
@@ -13513,14 +13513,14 @@
           </a:ln>
           <a:extLst>
             <a:ext uri="{909E8E84-426E-40dd-AFC4-6F175D3DCCD1}">
-              <a14:hiddenFill xmlns="" xmlns:a14="http://schemas.microsoft.com/office/drawing/2010/main">
+              <a14:hiddenFill xmlns:a14="http://schemas.microsoft.com/office/drawing/2010/main" xmlns="">
                 <a:solidFill>
                   <a:srgbClr val="FFFFFF"/>
                 </a:solidFill>
               </a14:hiddenFill>
             </a:ext>
             <a:ext uri="{91240B29-F687-4f45-9708-019B960494DF}">
-              <a14:hiddenLine xmlns="" xmlns:a14="http://schemas.microsoft.com/office/drawing/2010/main" w="9525">
+              <a14:hiddenLine xmlns:a14="http://schemas.microsoft.com/office/drawing/2010/main" xmlns="" w="9525">
                 <a:solidFill>
                   <a:srgbClr val="000000"/>
                 </a:solidFill>
@@ -13600,14 +13600,14 @@
           </a:ln>
           <a:extLst>
             <a:ext uri="{909E8E84-426E-40dd-AFC4-6F175D3DCCD1}">
-              <a14:hiddenFill xmlns="" xmlns:a14="http://schemas.microsoft.com/office/drawing/2010/main">
+              <a14:hiddenFill xmlns:a14="http://schemas.microsoft.com/office/drawing/2010/main" xmlns="">
                 <a:solidFill>
                   <a:srgbClr val="FFFFFF"/>
                 </a:solidFill>
               </a14:hiddenFill>
             </a:ext>
             <a:ext uri="{91240B29-F687-4f45-9708-019B960494DF}">
-              <a14:hiddenLine xmlns="" xmlns:a14="http://schemas.microsoft.com/office/drawing/2010/main" w="9525">
+              <a14:hiddenLine xmlns:a14="http://schemas.microsoft.com/office/drawing/2010/main" xmlns="" w="9525">
                 <a:solidFill>
                   <a:srgbClr val="000000"/>
                 </a:solidFill>
@@ -14195,17 +14195,17 @@
           </a:ln>
           <a:extLst>
             <a:ext uri="{FAA26D3D-D897-4be2-8F04-BA451C77F1D7}">
-              <ma14:placeholderFlag xmlns="" xmlns:ma14="http://schemas.microsoft.com/office/mac/drawingml/2011/main" val="1"/>
+              <ma14:placeholderFlag xmlns:ma14="http://schemas.microsoft.com/office/mac/drawingml/2011/main" xmlns="" val="1"/>
             </a:ext>
             <a:ext uri="{909E8E84-426E-40dd-AFC4-6F175D3DCCD1}">
-              <a14:hiddenFill xmlns="" xmlns:a14="http://schemas.microsoft.com/office/drawing/2010/main">
+              <a14:hiddenFill xmlns:a14="http://schemas.microsoft.com/office/drawing/2010/main" xmlns="">
                 <a:solidFill>
                   <a:srgbClr val="FFFFFF"/>
                 </a:solidFill>
               </a14:hiddenFill>
             </a:ext>
             <a:ext uri="{91240B29-F687-4f45-9708-019B960494DF}">
-              <a14:hiddenLine xmlns="" xmlns:a14="http://schemas.microsoft.com/office/drawing/2010/main" w="9525">
+              <a14:hiddenLine xmlns:a14="http://schemas.microsoft.com/office/drawing/2010/main" xmlns="" w="9525">
                 <a:solidFill>
                   <a:srgbClr val="000000"/>
                 </a:solidFill>
@@ -14289,14 +14289,14 @@
           </a:ln>
           <a:extLst>
             <a:ext uri="{909E8E84-426E-40dd-AFC4-6F175D3DCCD1}">
-              <a14:hiddenFill xmlns="" xmlns:a14="http://schemas.microsoft.com/office/drawing/2010/main">
+              <a14:hiddenFill xmlns:a14="http://schemas.microsoft.com/office/drawing/2010/main" xmlns="">
                 <a:solidFill>
                   <a:srgbClr val="FFFFFF"/>
                 </a:solidFill>
               </a14:hiddenFill>
             </a:ext>
             <a:ext uri="{91240B29-F687-4f45-9708-019B960494DF}">
-              <a14:hiddenLine xmlns="" xmlns:a14="http://schemas.microsoft.com/office/drawing/2010/main" w="9525">
+              <a14:hiddenLine xmlns:a14="http://schemas.microsoft.com/office/drawing/2010/main" xmlns="" w="9525">
                 <a:solidFill>
                   <a:srgbClr val="000000"/>
                 </a:solidFill>
@@ -14383,14 +14383,14 @@
           </a:ln>
           <a:extLst>
             <a:ext uri="{909E8E84-426E-40dd-AFC4-6F175D3DCCD1}">
-              <a14:hiddenFill xmlns="" xmlns:a14="http://schemas.microsoft.com/office/drawing/2010/main">
+              <a14:hiddenFill xmlns:a14="http://schemas.microsoft.com/office/drawing/2010/main" xmlns="">
                 <a:solidFill>
                   <a:srgbClr val="FFFFFF"/>
                 </a:solidFill>
               </a14:hiddenFill>
             </a:ext>
             <a:ext uri="{91240B29-F687-4f45-9708-019B960494DF}">
-              <a14:hiddenLine xmlns="" xmlns:a14="http://schemas.microsoft.com/office/drawing/2010/main" w="9525">
+              <a14:hiddenLine xmlns:a14="http://schemas.microsoft.com/office/drawing/2010/main" xmlns="" w="9525">
                 <a:solidFill>
                   <a:srgbClr val="000000"/>
                 </a:solidFill>
@@ -14470,14 +14470,14 @@
           </a:ln>
           <a:extLst>
             <a:ext uri="{909E8E84-426E-40dd-AFC4-6F175D3DCCD1}">
-              <a14:hiddenFill xmlns="" xmlns:a14="http://schemas.microsoft.com/office/drawing/2010/main">
+              <a14:hiddenFill xmlns:a14="http://schemas.microsoft.com/office/drawing/2010/main" xmlns="">
                 <a:solidFill>
                   <a:srgbClr val="FFFFFF"/>
                 </a:solidFill>
               </a14:hiddenFill>
             </a:ext>
             <a:ext uri="{91240B29-F687-4f45-9708-019B960494DF}">
-              <a14:hiddenLine xmlns="" xmlns:a14="http://schemas.microsoft.com/office/drawing/2010/main" w="9525">
+              <a14:hiddenLine xmlns:a14="http://schemas.microsoft.com/office/drawing/2010/main" xmlns="" w="9525">
                 <a:solidFill>
                   <a:srgbClr val="000000"/>
                 </a:solidFill>
@@ -15175,7 +15175,7 @@
         </p:nvSpPr>
         <p:spPr>
           <a:xfrm>
-            <a:off x="2260600" y="2492262"/>
+            <a:off x="2262370" y="2431994"/>
             <a:ext cx="1143000" cy="685800"/>
           </a:xfrm>
           <a:prstGeom prst="roundRect">
@@ -15223,7 +15223,7 @@
         </p:nvSpPr>
         <p:spPr>
           <a:xfrm>
-            <a:off x="4343400" y="3086100"/>
+            <a:off x="4405196" y="2402219"/>
             <a:ext cx="1143000" cy="685800"/>
           </a:xfrm>
           <a:prstGeom prst="roundRect">
@@ -15374,7 +15374,7 @@
         </p:nvSpPr>
         <p:spPr>
           <a:xfrm>
-            <a:off x="10754270" y="1973112"/>
+            <a:off x="10754270" y="2402219"/>
             <a:ext cx="1143000" cy="685800"/>
           </a:xfrm>
           <a:prstGeom prst="roundRect">
@@ -15467,15 +15467,15 @@
           <p:cNvPr id="11" name="Straight Connector 10"/>
           <p:cNvCxnSpPr>
             <a:cxnSpLocks/>
-            <a:stCxn id="3" idx="2"/>
+            <a:stCxn id="3" idx="3"/>
             <a:endCxn id="5" idx="1"/>
           </p:cNvCxnSpPr>
           <p:nvPr/>
         </p:nvCxnSpPr>
         <p:spPr>
-          <a:xfrm>
-            <a:off x="2832100" y="3178062"/>
-            <a:ext cx="1511300" cy="250938"/>
+          <a:xfrm flipV="1">
+            <a:off x="3405370" y="2745119"/>
+            <a:ext cx="999826" cy="29775"/>
           </a:xfrm>
           <a:prstGeom prst="line">
             <a:avLst/>
@@ -15513,8 +15513,8 @@
         </p:nvCxnSpPr>
         <p:spPr>
           <a:xfrm flipV="1">
-            <a:off x="5486400" y="2743200"/>
-            <a:ext cx="918449" cy="685800"/>
+            <a:off x="5548196" y="2743200"/>
+            <a:ext cx="856653" cy="1919"/>
           </a:xfrm>
           <a:prstGeom prst="line">
             <a:avLst/>
@@ -15545,15 +15545,15 @@
         <p:nvCxnSpPr>
           <p:cNvPr id="18" name="Straight Connector 17"/>
           <p:cNvCxnSpPr>
-            <a:stCxn id="5" idx="3"/>
+            <a:cxnSpLocks/>
             <a:endCxn id="7" idx="1"/>
           </p:cNvCxnSpPr>
           <p:nvPr/>
         </p:nvCxnSpPr>
         <p:spPr>
           <a:xfrm>
-            <a:off x="5486400" y="3429000"/>
-            <a:ext cx="918449" cy="685800"/>
+            <a:off x="5485254" y="3045511"/>
+            <a:ext cx="919595" cy="1069289"/>
           </a:xfrm>
           <a:prstGeom prst="line">
             <a:avLst/>
@@ -15588,7 +15588,7 @@
         </p:nvSpPr>
         <p:spPr>
           <a:xfrm>
-            <a:off x="317500" y="3086100"/>
+            <a:off x="317500" y="3120912"/>
             <a:ext cx="1143000" cy="685800"/>
           </a:xfrm>
           <a:prstGeom prst="roundRect">
@@ -15642,8 +15642,8 @@
         </p:nvCxnSpPr>
         <p:spPr>
           <a:xfrm flipV="1">
-            <a:off x="1460500" y="2835162"/>
-            <a:ext cx="800100" cy="593838"/>
+            <a:off x="1460500" y="2774894"/>
+            <a:ext cx="801870" cy="688918"/>
           </a:xfrm>
           <a:prstGeom prst="line">
             <a:avLst/>
@@ -15678,8 +15678,8 @@
         </p:nvSpPr>
         <p:spPr>
           <a:xfrm>
-            <a:off x="3641594" y="2953183"/>
-            <a:ext cx="675890" cy="984885"/>
+            <a:off x="3729370" y="2164236"/>
+            <a:ext cx="675826" cy="1231106"/>
           </a:xfrm>
           <a:prstGeom prst="rect">
             <a:avLst/>
@@ -15713,10 +15713,21 @@
               </a:rPr>
               <a:t>GET</a:t>
             </a:r>
+            <a:endParaRPr lang="en-US" sz="1600" i="1" kern="0" spc="-30" dirty="0">
+              <a:latin typeface="Arial"/>
+              <a:cs typeface="Arial"/>
+            </a:endParaRPr>
           </a:p>
           <a:p>
             <a:pPr algn="r"/>
-            <a:endParaRPr lang="en-US" sz="800" i="1" kern="0" spc="-30" dirty="0">
+            <a:r>
+              <a:rPr lang="en-US" sz="2400" i="1" kern="0" spc="-30" dirty="0">
+                <a:latin typeface="Arial"/>
+                <a:cs typeface="Arial"/>
+              </a:rPr>
+              <a:t> </a:t>
+            </a:r>
+            <a:endParaRPr lang="en-US" sz="1100" i="1" kern="0" spc="-30" dirty="0">
               <a:latin typeface="Arial"/>
               <a:cs typeface="Arial"/>
             </a:endParaRPr>
@@ -15751,7 +15762,7 @@
         </p:nvSpPr>
         <p:spPr>
           <a:xfrm>
-            <a:off x="8690879" y="1969223"/>
+            <a:off x="8665484" y="2401094"/>
             <a:ext cx="1276618" cy="685800"/>
           </a:xfrm>
           <a:prstGeom prst="roundRect">
@@ -15861,8 +15872,8 @@
         </p:nvCxnSpPr>
         <p:spPr>
           <a:xfrm>
-            <a:off x="9967497" y="2312123"/>
-            <a:ext cx="786773" cy="3889"/>
+            <a:off x="9942102" y="2743994"/>
+            <a:ext cx="812168" cy="1125"/>
           </a:xfrm>
           <a:prstGeom prst="line">
             <a:avLst/>
@@ -15972,7 +15983,7 @@
         </p:nvSpPr>
         <p:spPr>
           <a:xfrm>
-            <a:off x="6010485" y="3617386"/>
+            <a:off x="6214697" y="3576321"/>
             <a:ext cx="473528" cy="215444"/>
           </a:xfrm>
           <a:prstGeom prst="rect">
@@ -16007,7 +16018,7 @@
         </p:nvSpPr>
         <p:spPr>
           <a:xfrm>
-            <a:off x="8311108" y="2093076"/>
+            <a:off x="8272182" y="2465955"/>
             <a:ext cx="357149" cy="215444"/>
           </a:xfrm>
           <a:prstGeom prst="rect">
@@ -16042,7 +16053,7 @@
         </p:nvSpPr>
         <p:spPr>
           <a:xfrm>
-            <a:off x="4343400" y="1424168"/>
+            <a:off x="4405250" y="1153043"/>
             <a:ext cx="1143000" cy="685800"/>
           </a:xfrm>
           <a:prstGeom prst="roundRect">
@@ -16100,8 +16111,8 @@
         </p:nvCxnSpPr>
         <p:spPr>
           <a:xfrm flipV="1">
-            <a:off x="4914900" y="2109968"/>
-            <a:ext cx="0" cy="976132"/>
+            <a:off x="4976696" y="1838843"/>
+            <a:ext cx="54" cy="563376"/>
           </a:xfrm>
           <a:prstGeom prst="line">
             <a:avLst/>
@@ -16136,7 +16147,7 @@
         </p:nvSpPr>
         <p:spPr>
           <a:xfrm>
-            <a:off x="4337050" y="4398423"/>
+            <a:off x="4398846" y="3714542"/>
             <a:ext cx="1143000" cy="685800"/>
           </a:xfrm>
           <a:prstGeom prst="roundRect">
@@ -16194,7 +16205,7 @@
         </p:nvCxnSpPr>
         <p:spPr>
           <a:xfrm>
-            <a:off x="4908550" y="3771900"/>
+            <a:off x="4970346" y="3088019"/>
             <a:ext cx="0" cy="626523"/>
           </a:xfrm>
           <a:prstGeom prst="line">
@@ -16230,7 +16241,7 @@
         </p:nvSpPr>
         <p:spPr>
           <a:xfrm>
-            <a:off x="4484833" y="4190151"/>
+            <a:off x="4546629" y="3506270"/>
             <a:ext cx="347531" cy="215444"/>
           </a:xfrm>
           <a:prstGeom prst="rect">
@@ -16265,8 +16276,8 @@
         </p:nvSpPr>
         <p:spPr>
           <a:xfrm>
-            <a:off x="4977535" y="2123646"/>
-            <a:ext cx="470642" cy="738664"/>
+            <a:off x="5039385" y="1852521"/>
+            <a:ext cx="968855" cy="369332"/>
           </a:xfrm>
           <a:prstGeom prst="rect">
             <a:avLst/>
@@ -16287,7 +16298,7 @@
                 <a:latin typeface="Arial"/>
                 <a:cs typeface="Arial"/>
               </a:rPr>
-              <a:t>Insert</a:t>
+              <a:t>Insert, Select,</a:t>
             </a:r>
           </a:p>
           <a:p>
@@ -16296,25 +16307,7 @@
                 <a:latin typeface="Arial"/>
                 <a:cs typeface="Arial"/>
               </a:rPr>
-              <a:t>Select</a:t>
-            </a:r>
-          </a:p>
-          <a:p>
-            <a:r>
-              <a:rPr lang="en-US" sz="1200" i="1" kern="0" spc="-30" dirty="0">
-                <a:latin typeface="Arial"/>
-                <a:cs typeface="Arial"/>
-              </a:rPr>
-              <a:t>Update</a:t>
-            </a:r>
-          </a:p>
-          <a:p>
-            <a:r>
-              <a:rPr lang="en-US" sz="1200" i="1" kern="0" spc="-30" dirty="0">
-                <a:latin typeface="Arial"/>
-                <a:cs typeface="Arial"/>
-              </a:rPr>
-              <a:t>Delete</a:t>
+              <a:t>Update, Delete</a:t>
             </a:r>
           </a:p>
         </p:txBody>
@@ -16461,9 +16454,9 @@
           <p:nvPr/>
         </p:nvCxnSpPr>
         <p:spPr>
-          <a:xfrm flipV="1">
-            <a:off x="7547849" y="2312123"/>
-            <a:ext cx="1143030" cy="431077"/>
+          <a:xfrm>
+            <a:off x="7547849" y="2743200"/>
+            <a:ext cx="1117635" cy="794"/>
           </a:xfrm>
           <a:prstGeom prst="line">
             <a:avLst/>
@@ -16538,7 +16531,7 @@
         </p:nvSpPr>
         <p:spPr>
           <a:xfrm>
-            <a:off x="4337050" y="5634593"/>
+            <a:off x="4398846" y="4899718"/>
             <a:ext cx="1143000" cy="685800"/>
           </a:xfrm>
           <a:prstGeom prst="roundRect">
@@ -16590,8 +16583,8 @@
         </p:nvCxnSpPr>
         <p:spPr>
           <a:xfrm>
-            <a:off x="4908550" y="5084223"/>
-            <a:ext cx="0" cy="550370"/>
+            <a:off x="4970346" y="4400342"/>
+            <a:ext cx="0" cy="499376"/>
           </a:xfrm>
           <a:prstGeom prst="line">
             <a:avLst/>
@@ -16639,7 +16632,7 @@
             <a:avLst/>
           </a:prstGeom>
           <a:solidFill>
-            <a:schemeClr val="accent1"/>
+            <a:srgbClr val="233BC2"/>
           </a:solidFill>
           <a:ln>
             <a:noFill/>
@@ -16690,8 +16683,8 @@
         </p:nvCxnSpPr>
         <p:spPr>
           <a:xfrm flipV="1">
-            <a:off x="2842200" y="3429000"/>
-            <a:ext cx="1501200" cy="406400"/>
+            <a:off x="2842200" y="2745119"/>
+            <a:ext cx="1562996" cy="1090281"/>
           </a:xfrm>
           <a:prstGeom prst="line">
             <a:avLst/>
@@ -16736,8 +16729,8 @@
         </p:nvCxnSpPr>
         <p:spPr>
           <a:xfrm>
-            <a:off x="1460500" y="3429000"/>
-            <a:ext cx="810200" cy="749300"/>
+            <a:off x="1460500" y="3463812"/>
+            <a:ext cx="810200" cy="714488"/>
           </a:xfrm>
           <a:prstGeom prst="line">
             <a:avLst/>
@@ -16837,7 +16830,7 @@
         </p:nvSpPr>
         <p:spPr>
           <a:xfrm>
-            <a:off x="4967070" y="5418768"/>
+            <a:off x="5028866" y="4709487"/>
             <a:ext cx="890308" cy="215444"/>
           </a:xfrm>
           <a:prstGeom prst="rect">
@@ -16937,7 +16930,7 @@
         </p:nvSpPr>
         <p:spPr>
           <a:xfrm>
-            <a:off x="4377402" y="2123646"/>
+            <a:off x="4439252" y="1852521"/>
             <a:ext cx="454292" cy="215444"/>
           </a:xfrm>
           <a:prstGeom prst="rect">
@@ -17078,7 +17071,7 @@
         </p:nvSpPr>
         <p:spPr>
           <a:xfrm>
-            <a:off x="4979996" y="4190151"/>
+            <a:off x="5041792" y="3506270"/>
             <a:ext cx="257763" cy="215444"/>
           </a:xfrm>
           <a:prstGeom prst="rect">
@@ -17122,9 +17115,9 @@
           <p:nvPr/>
         </p:nvCxnSpPr>
         <p:spPr>
-          <a:xfrm flipV="1">
-            <a:off x="5480050" y="5242618"/>
-            <a:ext cx="924799" cy="734875"/>
+          <a:xfrm>
+            <a:off x="5541846" y="5242618"/>
+            <a:ext cx="863003" cy="0"/>
           </a:xfrm>
           <a:prstGeom prst="line">
             <a:avLst/>
@@ -17169,8 +17162,8 @@
         </p:nvCxnSpPr>
         <p:spPr>
           <a:xfrm>
-            <a:off x="5480050" y="5977493"/>
-            <a:ext cx="924799" cy="373109"/>
+            <a:off x="5541846" y="5242618"/>
+            <a:ext cx="863003" cy="1107984"/>
           </a:xfrm>
           <a:prstGeom prst="line">
             <a:avLst/>
@@ -17211,7 +17204,7 @@
         </p:nvSpPr>
         <p:spPr>
           <a:xfrm>
-            <a:off x="4445370" y="5423136"/>
+            <a:off x="4507166" y="4713855"/>
             <a:ext cx="387607" cy="215444"/>
           </a:xfrm>
           <a:prstGeom prst="rect">
@@ -17252,7 +17245,7 @@
         </p:nvSpPr>
         <p:spPr>
           <a:xfrm>
-            <a:off x="10367278" y="2076841"/>
+            <a:off x="10366181" y="2461923"/>
             <a:ext cx="357149" cy="215444"/>
           </a:xfrm>
           <a:prstGeom prst="rect">
@@ -17375,7 +17368,7 @@
         </p:nvSpPr>
         <p:spPr>
           <a:xfrm>
-            <a:off x="5944021" y="5974458"/>
+            <a:off x="5797389" y="6190406"/>
             <a:ext cx="473528" cy="215444"/>
           </a:xfrm>
           <a:prstGeom prst="rect">
@@ -17416,7 +17409,7 @@
         </p:nvSpPr>
         <p:spPr>
           <a:xfrm>
-            <a:off x="5892605" y="5048600"/>
+            <a:off x="5879905" y="5010500"/>
             <a:ext cx="473528" cy="215444"/>
           </a:xfrm>
           <a:prstGeom prst="rect">
@@ -17498,7 +17491,7 @@
         </p:nvSpPr>
         <p:spPr>
           <a:xfrm>
-            <a:off x="8654341" y="2996449"/>
+            <a:off x="8668257" y="3771106"/>
             <a:ext cx="1276618" cy="927783"/>
           </a:xfrm>
           <a:prstGeom prst="roundRect">
@@ -17559,8 +17552,8 @@
         </p:nvCxnSpPr>
         <p:spPr>
           <a:xfrm>
-            <a:off x="5486400" y="3429000"/>
-            <a:ext cx="3167941" cy="31341"/>
+            <a:off x="5548196" y="2745119"/>
+            <a:ext cx="3120061" cy="1489879"/>
           </a:xfrm>
           <a:prstGeom prst="line">
             <a:avLst/>
@@ -17601,7 +17594,7 @@
         </p:nvSpPr>
         <p:spPr>
           <a:xfrm>
-            <a:off x="8163365" y="3202617"/>
+            <a:off x="8201079" y="3806712"/>
             <a:ext cx="473528" cy="215444"/>
           </a:xfrm>
           <a:prstGeom prst="rect">
@@ -17642,7 +17635,7 @@
         </p:nvSpPr>
         <p:spPr>
           <a:xfrm>
-            <a:off x="5733994" y="5564203"/>
+            <a:off x="6102381" y="5576815"/>
             <a:ext cx="1459188" cy="430887"/>
           </a:xfrm>
           <a:prstGeom prst="rect">
@@ -17686,7 +17679,7 @@
         </p:nvSpPr>
         <p:spPr>
           <a:xfrm>
-            <a:off x="2270700" y="4944063"/>
+            <a:off x="2182566" y="4934006"/>
             <a:ext cx="1380994" cy="685800"/>
           </a:xfrm>
           <a:prstGeom prst="roundRect">
@@ -17737,13 +17730,14 @@
           </p:cNvPr>
           <p:cNvCxnSpPr>
             <a:cxnSpLocks/>
+            <a:stCxn id="33" idx="1"/>
           </p:cNvCxnSpPr>
           <p:nvPr/>
         </p:nvCxnSpPr>
         <p:spPr>
           <a:xfrm flipH="1">
-            <a:off x="3592800" y="3771900"/>
-            <a:ext cx="916473" cy="1177129"/>
+            <a:off x="3532644" y="4057442"/>
+            <a:ext cx="866202" cy="945049"/>
           </a:xfrm>
           <a:prstGeom prst="line">
             <a:avLst/>
@@ -17784,7 +17778,7 @@
         </p:nvSpPr>
         <p:spPr>
           <a:xfrm>
-            <a:off x="2390565" y="5977493"/>
+            <a:off x="2302431" y="5967436"/>
             <a:ext cx="1143000" cy="685800"/>
           </a:xfrm>
           <a:prstGeom prst="roundRect">
@@ -17842,7 +17836,7 @@
         </p:nvCxnSpPr>
         <p:spPr>
           <a:xfrm>
-            <a:off x="2961197" y="5629863"/>
+            <a:off x="2873063" y="5619806"/>
             <a:ext cx="868" cy="347630"/>
           </a:xfrm>
           <a:prstGeom prst="line">
@@ -17884,8 +17878,8 @@
         </p:nvSpPr>
         <p:spPr>
           <a:xfrm>
-            <a:off x="2341116" y="1153043"/>
-            <a:ext cx="1257309" cy="685800"/>
+            <a:off x="4410731" y="5969759"/>
+            <a:ext cx="1137466" cy="685800"/>
           </a:xfrm>
           <a:prstGeom prst="roundRect">
             <a:avLst/>
@@ -17924,95 +17918,6 @@
           </a:p>
         </p:txBody>
       </p:sp>
-      <p:cxnSp>
-        <p:nvCxnSpPr>
-          <p:cNvPr id="76" name="Straight Connector 75">
-            <a:extLst>
-              <a:ext uri="{FF2B5EF4-FFF2-40B4-BE49-F238E27FC236}">
-                <a16:creationId xmlns:a16="http://schemas.microsoft.com/office/drawing/2014/main" id="{DC9F345A-91E0-E541-AB74-C21172FEA3BB}"/>
-              </a:ext>
-            </a:extLst>
-          </p:cNvPr>
-          <p:cNvCxnSpPr>
-            <a:cxnSpLocks/>
-            <a:stCxn id="71" idx="1"/>
-          </p:cNvCxnSpPr>
-          <p:nvPr/>
-        </p:nvCxnSpPr>
-        <p:spPr>
-          <a:xfrm flipH="1">
-            <a:off x="2080766" y="6320393"/>
-            <a:ext cx="309799" cy="0"/>
-          </a:xfrm>
-          <a:prstGeom prst="line">
-            <a:avLst/>
-          </a:prstGeom>
-          <a:ln w="19050">
-            <a:solidFill>
-              <a:schemeClr val="tx1"/>
-            </a:solidFill>
-            <a:tailEnd type="none"/>
-          </a:ln>
-        </p:spPr>
-        <p:style>
-          <a:lnRef idx="1">
-            <a:schemeClr val="accent1"/>
-          </a:lnRef>
-          <a:fillRef idx="0">
-            <a:schemeClr val="accent1"/>
-          </a:fillRef>
-          <a:effectRef idx="0">
-            <a:schemeClr val="accent1"/>
-          </a:effectRef>
-          <a:fontRef idx="minor">
-            <a:schemeClr val="tx1"/>
-          </a:fontRef>
-        </p:style>
-      </p:cxnSp>
-      <p:cxnSp>
-        <p:nvCxnSpPr>
-          <p:cNvPr id="79" name="Straight Connector 78">
-            <a:extLst>
-              <a:ext uri="{FF2B5EF4-FFF2-40B4-BE49-F238E27FC236}">
-                <a16:creationId xmlns:a16="http://schemas.microsoft.com/office/drawing/2014/main" id="{349B09E2-EF70-5C44-83FE-C19FC0612112}"/>
-              </a:ext>
-            </a:extLst>
-          </p:cNvPr>
-          <p:cNvCxnSpPr>
-            <a:cxnSpLocks/>
-          </p:cNvCxnSpPr>
-          <p:nvPr/>
-        </p:nvCxnSpPr>
-        <p:spPr>
-          <a:xfrm flipH="1">
-            <a:off x="2080766" y="1495943"/>
-            <a:ext cx="59848" cy="4819033"/>
-          </a:xfrm>
-          <a:prstGeom prst="line">
-            <a:avLst/>
-          </a:prstGeom>
-          <a:ln w="19050">
-            <a:solidFill>
-              <a:schemeClr val="tx1"/>
-            </a:solidFill>
-            <a:tailEnd type="none"/>
-          </a:ln>
-        </p:spPr>
-        <p:style>
-          <a:lnRef idx="1">
-            <a:schemeClr val="accent1"/>
-          </a:lnRef>
-          <a:fillRef idx="0">
-            <a:schemeClr val="accent1"/>
-          </a:fillRef>
-          <a:effectRef idx="0">
-            <a:schemeClr val="accent1"/>
-          </a:effectRef>
-          <a:fontRef idx="minor">
-            <a:schemeClr val="tx1"/>
-          </a:fontRef>
-        </p:style>
-      </p:cxnSp>
       <p:cxnSp>
         <p:nvCxnSpPr>
           <p:cNvPr id="80" name="Straight Connector 79">
@@ -18024,14 +17929,15 @@
           </p:cNvPr>
           <p:cNvCxnSpPr>
             <a:cxnSpLocks/>
+            <a:stCxn id="71" idx="3"/>
             <a:endCxn id="73" idx="1"/>
           </p:cNvCxnSpPr>
           <p:nvPr/>
         </p:nvCxnSpPr>
         <p:spPr>
           <a:xfrm>
-            <a:off x="2120994" y="1495943"/>
-            <a:ext cx="220122" cy="0"/>
+            <a:off x="3445431" y="6310336"/>
+            <a:ext cx="965300" cy="2323"/>
           </a:xfrm>
           <a:prstGeom prst="line">
             <a:avLst/>
@@ -18072,7 +17978,7 @@
         </p:nvSpPr>
         <p:spPr>
           <a:xfrm>
-            <a:off x="3027352" y="5777532"/>
+            <a:off x="2939218" y="5767475"/>
             <a:ext cx="620683" cy="215444"/>
           </a:xfrm>
           <a:prstGeom prst="rect">
@@ -18113,7 +18019,7 @@
         </p:nvSpPr>
         <p:spPr>
           <a:xfrm>
-            <a:off x="3150129" y="4724582"/>
+            <a:off x="3124729" y="4711882"/>
             <a:ext cx="439223" cy="215444"/>
           </a:xfrm>
           <a:prstGeom prst="rect">
@@ -18154,7 +18060,7 @@
         </p:nvSpPr>
         <p:spPr>
           <a:xfrm>
-            <a:off x="3725352" y="4724582"/>
+            <a:off x="3663826" y="4826284"/>
             <a:ext cx="402995" cy="215444"/>
           </a:xfrm>
           <a:prstGeom prst="rect">
@@ -18195,7 +18101,7 @@
         </p:nvSpPr>
         <p:spPr>
           <a:xfrm>
-            <a:off x="1828595" y="1257538"/>
+            <a:off x="3910989" y="6046680"/>
             <a:ext cx="473528" cy="215444"/>
           </a:xfrm>
           <a:prstGeom prst="rect">
@@ -18318,7 +18224,7 @@
         </p:nvSpPr>
         <p:spPr>
           <a:xfrm>
-            <a:off x="2461157" y="5772262"/>
+            <a:off x="2373023" y="5762205"/>
             <a:ext cx="439223" cy="215444"/>
           </a:xfrm>
           <a:prstGeom prst="rect">
@@ -18345,6 +18251,209 @@
           </a:p>
         </p:txBody>
       </p:sp>
+      <p:sp>
+        <p:nvSpPr>
+          <p:cNvPr id="106" name="Rounded Rectangle 105">
+            <a:extLst>
+              <a:ext uri="{FF2B5EF4-FFF2-40B4-BE49-F238E27FC236}">
+                <a16:creationId xmlns:a16="http://schemas.microsoft.com/office/drawing/2014/main" id="{442742A7-2F47-E841-904D-3656BC7B7989}"/>
+              </a:ext>
+            </a:extLst>
+          </p:cNvPr>
+          <p:cNvSpPr/>
+          <p:nvPr/>
+        </p:nvSpPr>
+        <p:spPr>
+          <a:xfrm>
+            <a:off x="317500" y="1181252"/>
+            <a:ext cx="1143000" cy="685800"/>
+          </a:xfrm>
+          <a:prstGeom prst="roundRect">
+            <a:avLst/>
+          </a:prstGeom>
+          <a:solidFill>
+            <a:schemeClr val="tx1">
+              <a:lumMod val="50000"/>
+              <a:lumOff val="50000"/>
+            </a:schemeClr>
+          </a:solidFill>
+          <a:ln>
+            <a:noFill/>
+          </a:ln>
+          <a:effectLst/>
+        </p:spPr>
+        <p:style>
+          <a:lnRef idx="1">
+            <a:schemeClr val="accent1"/>
+          </a:lnRef>
+          <a:fillRef idx="3">
+            <a:schemeClr val="accent1"/>
+          </a:fillRef>
+          <a:effectRef idx="2">
+            <a:schemeClr val="accent1"/>
+          </a:effectRef>
+          <a:fontRef idx="minor">
+            <a:schemeClr val="lt1"/>
+          </a:fontRef>
+        </p:style>
+        <p:txBody>
+          <a:bodyPr rtlCol="0" anchor="ctr"/>
+          <a:lstStyle/>
+          <a:p>
+            <a:pPr algn="ctr"/>
+            <a:r>
+              <a:rPr lang="en-US" dirty="0"/>
+              <a:t>loopctl</a:t>
+            </a:r>
+          </a:p>
+        </p:txBody>
+      </p:sp>
+      <p:sp>
+        <p:nvSpPr>
+          <p:cNvPr id="121" name="Rounded Rectangle 120">
+            <a:extLst>
+              <a:ext uri="{FF2B5EF4-FFF2-40B4-BE49-F238E27FC236}">
+                <a16:creationId xmlns:a16="http://schemas.microsoft.com/office/drawing/2014/main" id="{A801E2D3-A919-E34D-8405-34B3E3AE0B43}"/>
+              </a:ext>
+            </a:extLst>
+          </p:cNvPr>
+          <p:cNvSpPr/>
+          <p:nvPr/>
+        </p:nvSpPr>
+        <p:spPr>
+          <a:xfrm>
+            <a:off x="2261561" y="1181252"/>
+            <a:ext cx="1143000" cy="685800"/>
+          </a:xfrm>
+          <a:prstGeom prst="roundRect">
+            <a:avLst/>
+          </a:prstGeom>
+          <a:solidFill>
+            <a:schemeClr val="accent1"/>
+          </a:solidFill>
+          <a:ln>
+            <a:noFill/>
+          </a:ln>
+          <a:effectLst/>
+        </p:spPr>
+        <p:style>
+          <a:lnRef idx="1">
+            <a:schemeClr val="accent1"/>
+          </a:lnRef>
+          <a:fillRef idx="3">
+            <a:schemeClr val="accent1"/>
+          </a:fillRef>
+          <a:effectRef idx="2">
+            <a:schemeClr val="accent1"/>
+          </a:effectRef>
+          <a:fontRef idx="minor">
+            <a:schemeClr val="lt1"/>
+          </a:fontRef>
+        </p:style>
+        <p:txBody>
+          <a:bodyPr rtlCol="0" anchor="ctr"/>
+          <a:lstStyle/>
+          <a:p>
+            <a:pPr algn="ctr"/>
+            <a:r>
+              <a:rPr lang="en-US" dirty="0"/>
+              <a:t>Looper</a:t>
+            </a:r>
+          </a:p>
+        </p:txBody>
+      </p:sp>
+      <p:cxnSp>
+        <p:nvCxnSpPr>
+          <p:cNvPr id="122" name="Straight Connector 121">
+            <a:extLst>
+              <a:ext uri="{FF2B5EF4-FFF2-40B4-BE49-F238E27FC236}">
+                <a16:creationId xmlns:a16="http://schemas.microsoft.com/office/drawing/2014/main" id="{98D97BF9-C35E-E946-A391-F3739F40AC99}"/>
+              </a:ext>
+            </a:extLst>
+          </p:cNvPr>
+          <p:cNvCxnSpPr>
+            <a:cxnSpLocks/>
+            <a:stCxn id="106" idx="3"/>
+            <a:endCxn id="121" idx="1"/>
+          </p:cNvCxnSpPr>
+          <p:nvPr/>
+        </p:nvCxnSpPr>
+        <p:spPr>
+          <a:xfrm>
+            <a:off x="1460500" y="1524152"/>
+            <a:ext cx="801061" cy="0"/>
+          </a:xfrm>
+          <a:prstGeom prst="line">
+            <a:avLst/>
+          </a:prstGeom>
+          <a:ln w="19050">
+            <a:solidFill>
+              <a:schemeClr val="tx1"/>
+            </a:solidFill>
+            <a:tailEnd type="arrow"/>
+          </a:ln>
+        </p:spPr>
+        <p:style>
+          <a:lnRef idx="1">
+            <a:schemeClr val="accent1"/>
+          </a:lnRef>
+          <a:fillRef idx="0">
+            <a:schemeClr val="accent1"/>
+          </a:fillRef>
+          <a:effectRef idx="0">
+            <a:schemeClr val="accent1"/>
+          </a:effectRef>
+          <a:fontRef idx="minor">
+            <a:schemeClr val="tx1"/>
+          </a:fontRef>
+        </p:style>
+      </p:cxnSp>
+      <p:cxnSp>
+        <p:nvCxnSpPr>
+          <p:cNvPr id="126" name="Straight Connector 125">
+            <a:extLst>
+              <a:ext uri="{FF2B5EF4-FFF2-40B4-BE49-F238E27FC236}">
+                <a16:creationId xmlns:a16="http://schemas.microsoft.com/office/drawing/2014/main" id="{412A4646-9E9A-7E49-97D6-A677D52B3A8F}"/>
+              </a:ext>
+            </a:extLst>
+          </p:cNvPr>
+          <p:cNvCxnSpPr>
+            <a:cxnSpLocks/>
+            <a:stCxn id="121" idx="2"/>
+            <a:endCxn id="5" idx="1"/>
+          </p:cNvCxnSpPr>
+          <p:nvPr/>
+        </p:nvCxnSpPr>
+        <p:spPr>
+          <a:xfrm>
+            <a:off x="2833061" y="1867052"/>
+            <a:ext cx="1572135" cy="878067"/>
+          </a:xfrm>
+          <a:prstGeom prst="line">
+            <a:avLst/>
+          </a:prstGeom>
+          <a:ln w="19050">
+            <a:solidFill>
+              <a:schemeClr val="tx1"/>
+            </a:solidFill>
+            <a:tailEnd type="arrow"/>
+          </a:ln>
+        </p:spPr>
+        <p:style>
+          <a:lnRef idx="1">
+            <a:schemeClr val="accent1"/>
+          </a:lnRef>
+          <a:fillRef idx="0">
+            <a:schemeClr val="accent1"/>
+          </a:fillRef>
+          <a:effectRef idx="0">
+            <a:schemeClr val="accent1"/>
+          </a:effectRef>
+          <a:fontRef idx="minor">
+            <a:schemeClr val="tx1"/>
+          </a:fontRef>
+        </p:style>
+      </p:cxnSp>
     </p:spTree>
     <p:extLst>
       <p:ext uri="{BB962C8B-B14F-4D97-AF65-F5344CB8AC3E}">

</xml_diff>

<commit_message>
Minor formatting improvements to diagram
</commit_message>
<xml_diff>
--- a/lab/Stock Trader Sample - Diagram.pptx
+++ b/lab/Stock Trader Sample - Diagram.pptx
@@ -17730,14 +17730,13 @@
           </p:cNvPr>
           <p:cNvCxnSpPr>
             <a:cxnSpLocks/>
-            <a:stCxn id="33" idx="1"/>
           </p:cNvCxnSpPr>
           <p:nvPr/>
         </p:nvCxnSpPr>
         <p:spPr>
           <a:xfrm flipH="1">
-            <a:off x="3532644" y="4057442"/>
-            <a:ext cx="866202" cy="945049"/>
+            <a:off x="3532644" y="3071729"/>
+            <a:ext cx="1084357" cy="1930762"/>
           </a:xfrm>
           <a:prstGeom prst="line">
             <a:avLst/>

</xml_diff>

<commit_message>
Show (optional) calls to TradeHistory
</commit_message>
<xml_diff>
--- a/lab/Stock Trader Sample - Diagram.pptx
+++ b/lab/Stock Trader Sample - Diagram.pptx
@@ -7,14 +7,15 @@
     <p:sldMasterId id="2147483742" r:id="rId3"/>
   </p:sldMasterIdLst>
   <p:notesMasterIdLst>
-    <p:notesMasterId r:id="rId6"/>
+    <p:notesMasterId r:id="rId7"/>
   </p:notesMasterIdLst>
   <p:handoutMasterIdLst>
-    <p:handoutMasterId r:id="rId7"/>
+    <p:handoutMasterId r:id="rId8"/>
   </p:handoutMasterIdLst>
   <p:sldIdLst>
     <p:sldId id="373" r:id="rId4"/>
     <p:sldId id="518" r:id="rId5"/>
+    <p:sldId id="519" r:id="rId6"/>
   </p:sldIdLst>
   <p:sldSz cx="12188825" cy="6858000"/>
   <p:notesSz cx="7102475" cy="9388475"/>
@@ -228,7 +229,7 @@
             <a:fld id="{D0752B3F-16DD-4F19-ACDD-F2069BC5BD4E}" type="datetimeFigureOut">
               <a:rPr lang="en-US" smtClean="0"/>
               <a:pPr/>
-              <a:t>12/19/18</a:t>
+              <a:t>3/26/19</a:t>
             </a:fld>
             <a:endParaRPr lang="en-US"/>
           </a:p>
@@ -395,7 +396,7 @@
             <a:fld id="{9FA6D163-A0F5-498D-A72B-50DE16555140}" type="datetimeFigureOut">
               <a:rPr lang="en-US" smtClean="0"/>
               <a:pPr/>
-              <a:t>12/19/18</a:t>
+              <a:t>3/26/19</a:t>
             </a:fld>
             <a:endParaRPr lang="en-US"/>
           </a:p>
@@ -4911,7 +4912,7 @@
           </a:ln>
           <a:extLst>
             <a:ext uri="{C572A759-6A51-4108-AA02-DFA0A04FC94B}">
-              <ma14:wrappingTextBoxFlag xmlns="" xmlns:ma14="http://schemas.microsoft.com/office/mac/drawingml/2011/main" val="1"/>
+              <ma14:wrappingTextBoxFlag xmlns:ma14="http://schemas.microsoft.com/office/mac/drawingml/2011/main" xmlns="" val="1"/>
             </a:ext>
           </a:extLst>
         </p:spPr>
@@ -5401,17 +5402,17 @@
           </a:ln>
           <a:extLst>
             <a:ext uri="{FAA26D3D-D897-4be2-8F04-BA451C77F1D7}">
-              <ma14:placeholderFlag xmlns:ma14="http://schemas.microsoft.com/office/mac/drawingml/2011/main" xmlns="" val="1"/>
+              <ma14:placeholderFlag xmlns="" xmlns:ma14="http://schemas.microsoft.com/office/mac/drawingml/2011/main" val="1"/>
             </a:ext>
             <a:ext uri="{909E8E84-426E-40dd-AFC4-6F175D3DCCD1}">
-              <a14:hiddenFill xmlns:a14="http://schemas.microsoft.com/office/drawing/2010/main" xmlns="">
+              <a14:hiddenFill xmlns="" xmlns:a14="http://schemas.microsoft.com/office/drawing/2010/main">
                 <a:solidFill>
                   <a:srgbClr val="FFFFFF"/>
                 </a:solidFill>
               </a14:hiddenFill>
             </a:ext>
             <a:ext uri="{91240B29-F687-4f45-9708-019B960494DF}">
-              <a14:hiddenLine xmlns:a14="http://schemas.microsoft.com/office/drawing/2010/main" xmlns="" w="9525">
+              <a14:hiddenLine xmlns="" xmlns:a14="http://schemas.microsoft.com/office/drawing/2010/main" w="9525">
                 <a:solidFill>
                   <a:srgbClr val="000000"/>
                 </a:solidFill>
@@ -5947,17 +5948,17 @@
           </a:ln>
           <a:extLst>
             <a:ext uri="{FAA26D3D-D897-4be2-8F04-BA451C77F1D7}">
-              <ma14:placeholderFlag xmlns:ma14="http://schemas.microsoft.com/office/mac/drawingml/2011/main" xmlns="" val="1"/>
+              <ma14:placeholderFlag xmlns="" xmlns:ma14="http://schemas.microsoft.com/office/mac/drawingml/2011/main" val="1"/>
             </a:ext>
             <a:ext uri="{909E8E84-426E-40dd-AFC4-6F175D3DCCD1}">
-              <a14:hiddenFill xmlns:a14="http://schemas.microsoft.com/office/drawing/2010/main" xmlns="">
+              <a14:hiddenFill xmlns="" xmlns:a14="http://schemas.microsoft.com/office/drawing/2010/main">
                 <a:solidFill>
                   <a:srgbClr val="FFFFFF"/>
                 </a:solidFill>
               </a14:hiddenFill>
             </a:ext>
             <a:ext uri="{91240B29-F687-4f45-9708-019B960494DF}">
-              <a14:hiddenLine xmlns:a14="http://schemas.microsoft.com/office/drawing/2010/main" xmlns="" w="9525">
+              <a14:hiddenLine xmlns="" xmlns:a14="http://schemas.microsoft.com/office/drawing/2010/main" w="9525">
                 <a:solidFill>
                   <a:srgbClr val="000000"/>
                 </a:solidFill>
@@ -6432,17 +6433,17 @@
           </a:ln>
           <a:extLst>
             <a:ext uri="{FAA26D3D-D897-4be2-8F04-BA451C77F1D7}">
-              <ma14:placeholderFlag xmlns:ma14="http://schemas.microsoft.com/office/mac/drawingml/2011/main" xmlns="" val="1"/>
+              <ma14:placeholderFlag xmlns="" xmlns:ma14="http://schemas.microsoft.com/office/mac/drawingml/2011/main" val="1"/>
             </a:ext>
             <a:ext uri="{909E8E84-426E-40dd-AFC4-6F175D3DCCD1}">
-              <a14:hiddenFill xmlns:a14="http://schemas.microsoft.com/office/drawing/2010/main" xmlns="">
+              <a14:hiddenFill xmlns="" xmlns:a14="http://schemas.microsoft.com/office/drawing/2010/main">
                 <a:solidFill>
                   <a:srgbClr val="FFFFFF"/>
                 </a:solidFill>
               </a14:hiddenFill>
             </a:ext>
             <a:ext uri="{91240B29-F687-4f45-9708-019B960494DF}">
-              <a14:hiddenLine xmlns:a14="http://schemas.microsoft.com/office/drawing/2010/main" xmlns="" w="9525">
+              <a14:hiddenLine xmlns="" xmlns:a14="http://schemas.microsoft.com/office/drawing/2010/main" w="9525">
                 <a:solidFill>
                   <a:srgbClr val="000000"/>
                 </a:solidFill>
@@ -6547,17 +6548,17 @@
           </a:ln>
           <a:extLst>
             <a:ext uri="{FAA26D3D-D897-4be2-8F04-BA451C77F1D7}">
-              <ma14:placeholderFlag xmlns:ma14="http://schemas.microsoft.com/office/mac/drawingml/2011/main" xmlns="" val="1"/>
+              <ma14:placeholderFlag xmlns="" xmlns:ma14="http://schemas.microsoft.com/office/mac/drawingml/2011/main" val="1"/>
             </a:ext>
             <a:ext uri="{909E8E84-426E-40dd-AFC4-6F175D3DCCD1}">
-              <a14:hiddenFill xmlns:a14="http://schemas.microsoft.com/office/drawing/2010/main" xmlns="">
+              <a14:hiddenFill xmlns="" xmlns:a14="http://schemas.microsoft.com/office/drawing/2010/main">
                 <a:solidFill>
                   <a:srgbClr val="FFFFFF"/>
                 </a:solidFill>
               </a14:hiddenFill>
             </a:ext>
             <a:ext uri="{91240B29-F687-4f45-9708-019B960494DF}">
-              <a14:hiddenLine xmlns:a14="http://schemas.microsoft.com/office/drawing/2010/main" xmlns="" w="9525">
+              <a14:hiddenLine xmlns="" xmlns:a14="http://schemas.microsoft.com/office/drawing/2010/main" w="9525">
                 <a:solidFill>
                   <a:srgbClr val="000000"/>
                 </a:solidFill>
@@ -7779,17 +7780,17 @@
           </a:ln>
           <a:extLst>
             <a:ext uri="{FAA26D3D-D897-4be2-8F04-BA451C77F1D7}">
-              <ma14:placeholderFlag xmlns:ma14="http://schemas.microsoft.com/office/mac/drawingml/2011/main" xmlns="" val="1"/>
+              <ma14:placeholderFlag xmlns="" xmlns:ma14="http://schemas.microsoft.com/office/mac/drawingml/2011/main" val="1"/>
             </a:ext>
             <a:ext uri="{909E8E84-426E-40dd-AFC4-6F175D3DCCD1}">
-              <a14:hiddenFill xmlns:a14="http://schemas.microsoft.com/office/drawing/2010/main" xmlns="">
+              <a14:hiddenFill xmlns="" xmlns:a14="http://schemas.microsoft.com/office/drawing/2010/main">
                 <a:solidFill>
                   <a:srgbClr val="FFFFFF"/>
                 </a:solidFill>
               </a14:hiddenFill>
             </a:ext>
             <a:ext uri="{91240B29-F687-4f45-9708-019B960494DF}">
-              <a14:hiddenLine xmlns:a14="http://schemas.microsoft.com/office/drawing/2010/main" xmlns="" w="9525">
+              <a14:hiddenLine xmlns="" xmlns:a14="http://schemas.microsoft.com/office/drawing/2010/main" w="9525">
                 <a:solidFill>
                   <a:srgbClr val="000000"/>
                 </a:solidFill>
@@ -8682,17 +8683,17 @@
           </a:ln>
           <a:extLst>
             <a:ext uri="{FAA26D3D-D897-4be2-8F04-BA451C77F1D7}">
-              <ma14:placeholderFlag xmlns:ma14="http://schemas.microsoft.com/office/mac/drawingml/2011/main" xmlns="" val="1"/>
+              <ma14:placeholderFlag xmlns="" xmlns:ma14="http://schemas.microsoft.com/office/mac/drawingml/2011/main" val="1"/>
             </a:ext>
             <a:ext uri="{909E8E84-426E-40dd-AFC4-6F175D3DCCD1}">
-              <a14:hiddenFill xmlns:a14="http://schemas.microsoft.com/office/drawing/2010/main" xmlns="">
+              <a14:hiddenFill xmlns="" xmlns:a14="http://schemas.microsoft.com/office/drawing/2010/main">
                 <a:solidFill>
                   <a:srgbClr val="FFFFFF"/>
                 </a:solidFill>
               </a14:hiddenFill>
             </a:ext>
             <a:ext uri="{91240B29-F687-4f45-9708-019B960494DF}">
-              <a14:hiddenLine xmlns:a14="http://schemas.microsoft.com/office/drawing/2010/main" xmlns="" w="9525">
+              <a14:hiddenLine xmlns="" xmlns:a14="http://schemas.microsoft.com/office/drawing/2010/main" w="9525">
                 <a:solidFill>
                   <a:srgbClr val="000000"/>
                 </a:solidFill>
@@ -9411,17 +9412,17 @@
           </a:ln>
           <a:extLst>
             <a:ext uri="{FAA26D3D-D897-4be2-8F04-BA451C77F1D7}">
-              <ma14:placeholderFlag xmlns:ma14="http://schemas.microsoft.com/office/mac/drawingml/2011/main" xmlns="" val="1"/>
+              <ma14:placeholderFlag xmlns="" xmlns:ma14="http://schemas.microsoft.com/office/mac/drawingml/2011/main" val="1"/>
             </a:ext>
             <a:ext uri="{909E8E84-426E-40dd-AFC4-6F175D3DCCD1}">
-              <a14:hiddenFill xmlns:a14="http://schemas.microsoft.com/office/drawing/2010/main" xmlns="">
+              <a14:hiddenFill xmlns="" xmlns:a14="http://schemas.microsoft.com/office/drawing/2010/main">
                 <a:solidFill>
                   <a:srgbClr val="FFFFFF"/>
                 </a:solidFill>
               </a14:hiddenFill>
             </a:ext>
             <a:ext uri="{91240B29-F687-4f45-9708-019B960494DF}">
-              <a14:hiddenLine xmlns:a14="http://schemas.microsoft.com/office/drawing/2010/main" xmlns="" w="9525">
+              <a14:hiddenLine xmlns="" xmlns:a14="http://schemas.microsoft.com/office/drawing/2010/main" w="9525">
                 <a:solidFill>
                   <a:srgbClr val="000000"/>
                 </a:solidFill>
@@ -9896,17 +9897,17 @@
           </a:ln>
           <a:extLst>
             <a:ext uri="{FAA26D3D-D897-4be2-8F04-BA451C77F1D7}">
-              <ma14:placeholderFlag xmlns:ma14="http://schemas.microsoft.com/office/mac/drawingml/2011/main" xmlns="" val="1"/>
+              <ma14:placeholderFlag xmlns="" xmlns:ma14="http://schemas.microsoft.com/office/mac/drawingml/2011/main" val="1"/>
             </a:ext>
             <a:ext uri="{909E8E84-426E-40dd-AFC4-6F175D3DCCD1}">
-              <a14:hiddenFill xmlns:a14="http://schemas.microsoft.com/office/drawing/2010/main" xmlns="">
+              <a14:hiddenFill xmlns="" xmlns:a14="http://schemas.microsoft.com/office/drawing/2010/main">
                 <a:solidFill>
                   <a:srgbClr val="FFFFFF"/>
                 </a:solidFill>
               </a14:hiddenFill>
             </a:ext>
             <a:ext uri="{91240B29-F687-4f45-9708-019B960494DF}">
-              <a14:hiddenLine xmlns:a14="http://schemas.microsoft.com/office/drawing/2010/main" xmlns="" w="9525">
+              <a14:hiddenLine xmlns="" xmlns:a14="http://schemas.microsoft.com/office/drawing/2010/main" w="9525">
                 <a:solidFill>
                   <a:srgbClr val="000000"/>
                 </a:solidFill>
@@ -10011,17 +10012,17 @@
           </a:ln>
           <a:extLst>
             <a:ext uri="{FAA26D3D-D897-4be2-8F04-BA451C77F1D7}">
-              <ma14:placeholderFlag xmlns:ma14="http://schemas.microsoft.com/office/mac/drawingml/2011/main" xmlns="" val="1"/>
+              <ma14:placeholderFlag xmlns="" xmlns:ma14="http://schemas.microsoft.com/office/mac/drawingml/2011/main" val="1"/>
             </a:ext>
             <a:ext uri="{909E8E84-426E-40dd-AFC4-6F175D3DCCD1}">
-              <a14:hiddenFill xmlns:a14="http://schemas.microsoft.com/office/drawing/2010/main" xmlns="">
+              <a14:hiddenFill xmlns="" xmlns:a14="http://schemas.microsoft.com/office/drawing/2010/main">
                 <a:solidFill>
                   <a:srgbClr val="FFFFFF"/>
                 </a:solidFill>
               </a14:hiddenFill>
             </a:ext>
             <a:ext uri="{91240B29-F687-4f45-9708-019B960494DF}">
-              <a14:hiddenLine xmlns:a14="http://schemas.microsoft.com/office/drawing/2010/main" xmlns="" w="9525">
+              <a14:hiddenLine xmlns="" xmlns:a14="http://schemas.microsoft.com/office/drawing/2010/main" w="9525">
                 <a:solidFill>
                   <a:srgbClr val="000000"/>
                 </a:solidFill>
@@ -10967,17 +10968,17 @@
           </a:ln>
           <a:extLst>
             <a:ext uri="{FAA26D3D-D897-4be2-8F04-BA451C77F1D7}">
-              <ma14:placeholderFlag xmlns:ma14="http://schemas.microsoft.com/office/mac/drawingml/2011/main" xmlns="" val="1"/>
+              <ma14:placeholderFlag xmlns="" xmlns:ma14="http://schemas.microsoft.com/office/mac/drawingml/2011/main" val="1"/>
             </a:ext>
             <a:ext uri="{909E8E84-426E-40dd-AFC4-6F175D3DCCD1}">
-              <a14:hiddenFill xmlns:a14="http://schemas.microsoft.com/office/drawing/2010/main" xmlns="">
+              <a14:hiddenFill xmlns="" xmlns:a14="http://schemas.microsoft.com/office/drawing/2010/main">
                 <a:solidFill>
                   <a:srgbClr val="FFFFFF"/>
                 </a:solidFill>
               </a14:hiddenFill>
             </a:ext>
             <a:ext uri="{91240B29-F687-4f45-9708-019B960494DF}">
-              <a14:hiddenLine xmlns:a14="http://schemas.microsoft.com/office/drawing/2010/main" xmlns="" w="9525">
+              <a14:hiddenLine xmlns="" xmlns:a14="http://schemas.microsoft.com/office/drawing/2010/main" w="9525">
                 <a:solidFill>
                   <a:srgbClr val="000000"/>
                 </a:solidFill>
@@ -13325,17 +13326,17 @@
           </a:ln>
           <a:extLst>
             <a:ext uri="{FAA26D3D-D897-4be2-8F04-BA451C77F1D7}">
-              <ma14:placeholderFlag xmlns:ma14="http://schemas.microsoft.com/office/mac/drawingml/2011/main" xmlns="" val="1"/>
+              <ma14:placeholderFlag xmlns="" xmlns:ma14="http://schemas.microsoft.com/office/mac/drawingml/2011/main" val="1"/>
             </a:ext>
             <a:ext uri="{909E8E84-426E-40dd-AFC4-6F175D3DCCD1}">
-              <a14:hiddenFill xmlns:a14="http://schemas.microsoft.com/office/drawing/2010/main" xmlns="">
+              <a14:hiddenFill xmlns="" xmlns:a14="http://schemas.microsoft.com/office/drawing/2010/main">
                 <a:solidFill>
                   <a:srgbClr val="FFFFFF"/>
                 </a:solidFill>
               </a14:hiddenFill>
             </a:ext>
             <a:ext uri="{91240B29-F687-4f45-9708-019B960494DF}">
-              <a14:hiddenLine xmlns:a14="http://schemas.microsoft.com/office/drawing/2010/main" xmlns="" w="9525">
+              <a14:hiddenLine xmlns="" xmlns:a14="http://schemas.microsoft.com/office/drawing/2010/main" w="9525">
                 <a:solidFill>
                   <a:srgbClr val="000000"/>
                 </a:solidFill>
@@ -13419,14 +13420,14 @@
           </a:ln>
           <a:extLst>
             <a:ext uri="{909E8E84-426E-40dd-AFC4-6F175D3DCCD1}">
-              <a14:hiddenFill xmlns:a14="http://schemas.microsoft.com/office/drawing/2010/main" xmlns="">
+              <a14:hiddenFill xmlns="" xmlns:a14="http://schemas.microsoft.com/office/drawing/2010/main">
                 <a:solidFill>
                   <a:srgbClr val="FFFFFF"/>
                 </a:solidFill>
               </a14:hiddenFill>
             </a:ext>
             <a:ext uri="{91240B29-F687-4f45-9708-019B960494DF}">
-              <a14:hiddenLine xmlns:a14="http://schemas.microsoft.com/office/drawing/2010/main" xmlns="" w="9525">
+              <a14:hiddenLine xmlns="" xmlns:a14="http://schemas.microsoft.com/office/drawing/2010/main" w="9525">
                 <a:solidFill>
                   <a:srgbClr val="000000"/>
                 </a:solidFill>
@@ -13513,14 +13514,14 @@
           </a:ln>
           <a:extLst>
             <a:ext uri="{909E8E84-426E-40dd-AFC4-6F175D3DCCD1}">
-              <a14:hiddenFill xmlns:a14="http://schemas.microsoft.com/office/drawing/2010/main" xmlns="">
+              <a14:hiddenFill xmlns="" xmlns:a14="http://schemas.microsoft.com/office/drawing/2010/main">
                 <a:solidFill>
                   <a:srgbClr val="FFFFFF"/>
                 </a:solidFill>
               </a14:hiddenFill>
             </a:ext>
             <a:ext uri="{91240B29-F687-4f45-9708-019B960494DF}">
-              <a14:hiddenLine xmlns:a14="http://schemas.microsoft.com/office/drawing/2010/main" xmlns="" w="9525">
+              <a14:hiddenLine xmlns="" xmlns:a14="http://schemas.microsoft.com/office/drawing/2010/main" w="9525">
                 <a:solidFill>
                   <a:srgbClr val="000000"/>
                 </a:solidFill>
@@ -13600,14 +13601,14 @@
           </a:ln>
           <a:extLst>
             <a:ext uri="{909E8E84-426E-40dd-AFC4-6F175D3DCCD1}">
-              <a14:hiddenFill xmlns:a14="http://schemas.microsoft.com/office/drawing/2010/main" xmlns="">
+              <a14:hiddenFill xmlns="" xmlns:a14="http://schemas.microsoft.com/office/drawing/2010/main">
                 <a:solidFill>
                   <a:srgbClr val="FFFFFF"/>
                 </a:solidFill>
               </a14:hiddenFill>
             </a:ext>
             <a:ext uri="{91240B29-F687-4f45-9708-019B960494DF}">
-              <a14:hiddenLine xmlns:a14="http://schemas.microsoft.com/office/drawing/2010/main" xmlns="" w="9525">
+              <a14:hiddenLine xmlns="" xmlns:a14="http://schemas.microsoft.com/office/drawing/2010/main" w="9525">
                 <a:solidFill>
                   <a:srgbClr val="000000"/>
                 </a:solidFill>
@@ -14195,17 +14196,17 @@
           </a:ln>
           <a:extLst>
             <a:ext uri="{FAA26D3D-D897-4be2-8F04-BA451C77F1D7}">
-              <ma14:placeholderFlag xmlns:ma14="http://schemas.microsoft.com/office/mac/drawingml/2011/main" xmlns="" val="1"/>
+              <ma14:placeholderFlag xmlns="" xmlns:ma14="http://schemas.microsoft.com/office/mac/drawingml/2011/main" val="1"/>
             </a:ext>
             <a:ext uri="{909E8E84-426E-40dd-AFC4-6F175D3DCCD1}">
-              <a14:hiddenFill xmlns:a14="http://schemas.microsoft.com/office/drawing/2010/main" xmlns="">
+              <a14:hiddenFill xmlns="" xmlns:a14="http://schemas.microsoft.com/office/drawing/2010/main">
                 <a:solidFill>
                   <a:srgbClr val="FFFFFF"/>
                 </a:solidFill>
               </a14:hiddenFill>
             </a:ext>
             <a:ext uri="{91240B29-F687-4f45-9708-019B960494DF}">
-              <a14:hiddenLine xmlns:a14="http://schemas.microsoft.com/office/drawing/2010/main" xmlns="" w="9525">
+              <a14:hiddenLine xmlns="" xmlns:a14="http://schemas.microsoft.com/office/drawing/2010/main" w="9525">
                 <a:solidFill>
                   <a:srgbClr val="000000"/>
                 </a:solidFill>
@@ -14289,14 +14290,14 @@
           </a:ln>
           <a:extLst>
             <a:ext uri="{909E8E84-426E-40dd-AFC4-6F175D3DCCD1}">
-              <a14:hiddenFill xmlns:a14="http://schemas.microsoft.com/office/drawing/2010/main" xmlns="">
+              <a14:hiddenFill xmlns="" xmlns:a14="http://schemas.microsoft.com/office/drawing/2010/main">
                 <a:solidFill>
                   <a:srgbClr val="FFFFFF"/>
                 </a:solidFill>
               </a14:hiddenFill>
             </a:ext>
             <a:ext uri="{91240B29-F687-4f45-9708-019B960494DF}">
-              <a14:hiddenLine xmlns:a14="http://schemas.microsoft.com/office/drawing/2010/main" xmlns="" w="9525">
+              <a14:hiddenLine xmlns="" xmlns:a14="http://schemas.microsoft.com/office/drawing/2010/main" w="9525">
                 <a:solidFill>
                   <a:srgbClr val="000000"/>
                 </a:solidFill>
@@ -14383,14 +14384,14 @@
           </a:ln>
           <a:extLst>
             <a:ext uri="{909E8E84-426E-40dd-AFC4-6F175D3DCCD1}">
-              <a14:hiddenFill xmlns:a14="http://schemas.microsoft.com/office/drawing/2010/main" xmlns="">
+              <a14:hiddenFill xmlns="" xmlns:a14="http://schemas.microsoft.com/office/drawing/2010/main">
                 <a:solidFill>
                   <a:srgbClr val="FFFFFF"/>
                 </a:solidFill>
               </a14:hiddenFill>
             </a:ext>
             <a:ext uri="{91240B29-F687-4f45-9708-019B960494DF}">
-              <a14:hiddenLine xmlns:a14="http://schemas.microsoft.com/office/drawing/2010/main" xmlns="" w="9525">
+              <a14:hiddenLine xmlns="" xmlns:a14="http://schemas.microsoft.com/office/drawing/2010/main" w="9525">
                 <a:solidFill>
                   <a:srgbClr val="000000"/>
                 </a:solidFill>
@@ -14470,14 +14471,14 @@
           </a:ln>
           <a:extLst>
             <a:ext uri="{909E8E84-426E-40dd-AFC4-6F175D3DCCD1}">
-              <a14:hiddenFill xmlns:a14="http://schemas.microsoft.com/office/drawing/2010/main" xmlns="">
+              <a14:hiddenFill xmlns="" xmlns:a14="http://schemas.microsoft.com/office/drawing/2010/main">
                 <a:solidFill>
                   <a:srgbClr val="FFFFFF"/>
                 </a:solidFill>
               </a14:hiddenFill>
             </a:ext>
             <a:ext uri="{91240B29-F687-4f45-9708-019B960494DF}">
-              <a14:hiddenLine xmlns:a14="http://schemas.microsoft.com/office/drawing/2010/main" xmlns="" w="9525">
+              <a14:hiddenLine xmlns="" xmlns:a14="http://schemas.microsoft.com/office/drawing/2010/main" w="9525">
                 <a:solidFill>
                   <a:srgbClr val="000000"/>
                 </a:solidFill>
@@ -15135,7 +15136,7 @@
                   <a:schemeClr val="tx1"/>
                 </a:solidFill>
               </a:rPr>
-              <a:t>IBM Cloud Private</a:t>
+              <a:t>IBM Cloud Private (or IKS or OCP)</a:t>
             </a:r>
           </a:p>
         </p:txBody>
@@ -15162,7 +15163,7 @@
           <a:p>
             <a:r>
               <a:rPr lang="en-US" sz="2800" dirty="0"/>
-              <a:t>Stock Trader sample for IBM Cloud Private</a:t>
+              <a:t>Stock Trader sample for IBM Cloud Private (or IKS or OCP)</a:t>
             </a:r>
           </a:p>
         </p:txBody>
@@ -15319,7 +15320,7 @@
         </p:nvSpPr>
         <p:spPr>
           <a:xfrm>
-            <a:off x="6404849" y="3771900"/>
+            <a:off x="6404865" y="3716020"/>
             <a:ext cx="1143000" cy="685800"/>
           </a:xfrm>
           <a:prstGeom prst="roundRect">
@@ -15552,8 +15553,8 @@
         </p:nvCxnSpPr>
         <p:spPr>
           <a:xfrm>
-            <a:off x="5485254" y="3045511"/>
-            <a:ext cx="919595" cy="1069289"/>
+            <a:off x="5508137" y="3052345"/>
+            <a:ext cx="896728" cy="1006575"/>
           </a:xfrm>
           <a:prstGeom prst="line">
             <a:avLst/>
@@ -15678,7 +15679,7 @@
         </p:nvSpPr>
         <p:spPr>
           <a:xfrm>
-            <a:off x="3729370" y="2164236"/>
+            <a:off x="3718484" y="2164236"/>
             <a:ext cx="675826" cy="1231106"/>
           </a:xfrm>
           <a:prstGeom prst="rect">
@@ -15983,7 +15984,7 @@
         </p:nvSpPr>
         <p:spPr>
           <a:xfrm>
-            <a:off x="6214697" y="3576321"/>
+            <a:off x="6128512" y="3532369"/>
             <a:ext cx="473528" cy="215444"/>
           </a:xfrm>
           <a:prstGeom prst="rect">
@@ -16320,7 +16321,7 @@
         </p:nvSpPr>
         <p:spPr>
           <a:xfrm>
-            <a:off x="6404849" y="1059832"/>
+            <a:off x="6404849" y="1085232"/>
             <a:ext cx="1143000" cy="685800"/>
           </a:xfrm>
           <a:prstGeom prst="roundRect">
@@ -16371,8 +16372,8 @@
         </p:nvCxnSpPr>
         <p:spPr>
           <a:xfrm flipV="1">
-            <a:off x="6976349" y="1745632"/>
-            <a:ext cx="0" cy="654668"/>
+            <a:off x="6976349" y="1771032"/>
+            <a:ext cx="0" cy="629268"/>
           </a:xfrm>
           <a:prstGeom prst="line">
             <a:avLst/>
@@ -16407,7 +16408,7 @@
         </p:nvSpPr>
         <p:spPr>
           <a:xfrm>
-            <a:off x="7004506" y="1730001"/>
+            <a:off x="7017206" y="1755401"/>
             <a:ext cx="357149" cy="430887"/>
           </a:xfrm>
           <a:prstGeom prst="rect">
@@ -16531,8 +16532,8 @@
         </p:nvSpPr>
         <p:spPr>
           <a:xfrm>
-            <a:off x="4398846" y="4899718"/>
-            <a:ext cx="1143000" cy="685800"/>
+            <a:off x="4363553" y="4914471"/>
+            <a:ext cx="1213655" cy="685800"/>
           </a:xfrm>
           <a:prstGeom prst="roundRect">
             <a:avLst/>
@@ -16565,7 +16566,7 @@
           <a:p>
             <a:pPr algn="ctr"/>
             <a:r>
-              <a:rPr lang="en-US" sz="1400" dirty="0"/>
+              <a:rPr lang="en-US" sz="1500" dirty="0"/>
               <a:t>Messaging</a:t>
             </a:r>
           </a:p>
@@ -16584,7 +16585,7 @@
         <p:spPr>
           <a:xfrm>
             <a:off x="4970346" y="4400342"/>
-            <a:ext cx="0" cy="499376"/>
+            <a:ext cx="35" cy="514129"/>
           </a:xfrm>
           <a:prstGeom prst="line">
             <a:avLst/>
@@ -16625,7 +16626,7 @@
         </p:nvSpPr>
         <p:spPr>
           <a:xfrm>
-            <a:off x="2270700" y="3835400"/>
+            <a:off x="2260496" y="3714542"/>
             <a:ext cx="1143000" cy="685800"/>
           </a:xfrm>
           <a:prstGeom prst="roundRect">
@@ -16683,8 +16684,8 @@
         </p:nvCxnSpPr>
         <p:spPr>
           <a:xfrm flipV="1">
-            <a:off x="2842200" y="2745119"/>
-            <a:ext cx="1562996" cy="1090281"/>
+            <a:off x="2831996" y="2745119"/>
+            <a:ext cx="1573200" cy="969423"/>
           </a:xfrm>
           <a:prstGeom prst="line">
             <a:avLst/>
@@ -16730,7 +16731,7 @@
         <p:spPr>
           <a:xfrm>
             <a:off x="1460500" y="3463812"/>
-            <a:ext cx="810200" cy="714488"/>
+            <a:ext cx="799996" cy="593630"/>
           </a:xfrm>
           <a:prstGeom prst="line">
             <a:avLst/>
@@ -17100,52 +17101,6 @@
       </p:sp>
       <p:cxnSp>
         <p:nvCxnSpPr>
-          <p:cNvPr id="78" name="Straight Connector 77">
-            <a:extLst>
-              <a:ext uri="{FF2B5EF4-FFF2-40B4-BE49-F238E27FC236}">
-                <a16:creationId xmlns:a16="http://schemas.microsoft.com/office/drawing/2014/main" id="{5CC5DE1F-F8DE-6047-AC77-8126B924BF0A}"/>
-              </a:ext>
-            </a:extLst>
-          </p:cNvPr>
-          <p:cNvCxnSpPr>
-            <a:cxnSpLocks/>
-            <a:stCxn id="74" idx="3"/>
-            <a:endCxn id="60" idx="1"/>
-          </p:cNvCxnSpPr>
-          <p:nvPr/>
-        </p:nvCxnSpPr>
-        <p:spPr>
-          <a:xfrm>
-            <a:off x="5541846" y="5242618"/>
-            <a:ext cx="863003" cy="0"/>
-          </a:xfrm>
-          <a:prstGeom prst="line">
-            <a:avLst/>
-          </a:prstGeom>
-          <a:ln w="19050">
-            <a:solidFill>
-              <a:schemeClr val="tx1"/>
-            </a:solidFill>
-            <a:tailEnd type="arrow"/>
-          </a:ln>
-        </p:spPr>
-        <p:style>
-          <a:lnRef idx="1">
-            <a:schemeClr val="accent1"/>
-          </a:lnRef>
-          <a:fillRef idx="0">
-            <a:schemeClr val="accent1"/>
-          </a:fillRef>
-          <a:effectRef idx="0">
-            <a:schemeClr val="accent1"/>
-          </a:effectRef>
-          <a:fontRef idx="minor">
-            <a:schemeClr val="tx1"/>
-          </a:fontRef>
-        </p:style>
-      </p:cxnSp>
-      <p:cxnSp>
-        <p:nvCxnSpPr>
           <p:cNvPr id="81" name="Straight Connector 80">
             <a:extLst>
               <a:ext uri="{FF2B5EF4-FFF2-40B4-BE49-F238E27FC236}">
@@ -17156,14 +17111,14 @@
           <p:cNvCxnSpPr>
             <a:cxnSpLocks/>
             <a:stCxn id="74" idx="3"/>
-            <a:endCxn id="63" idx="1"/>
+            <a:endCxn id="16" idx="1"/>
           </p:cNvCxnSpPr>
           <p:nvPr/>
         </p:nvCxnSpPr>
         <p:spPr>
           <a:xfrm>
-            <a:off x="5541846" y="5242618"/>
-            <a:ext cx="863003" cy="1107984"/>
+            <a:off x="5577208" y="5257371"/>
+            <a:ext cx="618968" cy="417741"/>
           </a:xfrm>
           <a:prstGeom prst="line">
             <a:avLst/>
@@ -17368,48 +17323,7 @@
         </p:nvSpPr>
         <p:spPr>
           <a:xfrm>
-            <a:off x="5797389" y="6190406"/>
-            <a:ext cx="473528" cy="215444"/>
-          </a:xfrm>
-          <a:prstGeom prst="rect">
-            <a:avLst/>
-          </a:prstGeom>
-          <a:noFill/>
-          <a:ln>
-            <a:noFill/>
-          </a:ln>
-        </p:spPr>
-        <p:txBody>
-          <a:bodyPr wrap="none" lIns="0" tIns="0" rIns="0" bIns="0" rtlCol="0">
-            <a:spAutoFit/>
-          </a:bodyPr>
-          <a:lstStyle/>
-          <a:p>
-            <a:r>
-              <a:rPr lang="en-US" sz="1400" i="1" kern="0" spc="-30" dirty="0">
-                <a:latin typeface="Arial"/>
-                <a:cs typeface="Arial"/>
-              </a:rPr>
-              <a:t>POST</a:t>
-            </a:r>
-          </a:p>
-        </p:txBody>
-      </p:sp>
-      <p:sp>
-        <p:nvSpPr>
-          <p:cNvPr id="89" name="TextBox 88">
-            <a:extLst>
-              <a:ext uri="{FF2B5EF4-FFF2-40B4-BE49-F238E27FC236}">
-                <a16:creationId xmlns:a16="http://schemas.microsoft.com/office/drawing/2014/main" id="{3288A47F-E4D8-5041-87E6-229F61467A7E}"/>
-              </a:ext>
-            </a:extLst>
-          </p:cNvPr>
-          <p:cNvSpPr txBox="1"/>
-          <p:nvPr/>
-        </p:nvSpPr>
-        <p:spPr>
-          <a:xfrm>
-            <a:off x="5879905" y="5010500"/>
+            <a:off x="5717090" y="5669570"/>
             <a:ext cx="473528" cy="215444"/>
           </a:xfrm>
           <a:prstGeom prst="rect">
@@ -17635,8 +17549,8 @@
         </p:nvSpPr>
         <p:spPr>
           <a:xfrm>
-            <a:off x="6102381" y="5576815"/>
-            <a:ext cx="1459188" cy="430887"/>
+            <a:off x="6330292" y="5576815"/>
+            <a:ext cx="1290652" cy="430887"/>
           </a:xfrm>
           <a:prstGeom prst="rect">
             <a:avLst/>
@@ -17652,6 +17566,7 @@
           </a:bodyPr>
           <a:lstStyle/>
           <a:p>
+            <a:pPr algn="ctr"/>
             <a:r>
               <a:rPr lang="en-US" sz="1400" i="1" kern="0" spc="-30" dirty="0">
                 <a:solidFill>
@@ -17660,7 +17575,7 @@
                 <a:latin typeface="Arial"/>
                 <a:cs typeface="Arial"/>
               </a:rPr>
-              <a:t>      Uses an Istio routing rule here</a:t>
+              <a:t>Uses an Istio routing rule here</a:t>
             </a:r>
           </a:p>
         </p:txBody>
@@ -17679,7 +17594,7 @@
         </p:nvSpPr>
         <p:spPr>
           <a:xfrm>
-            <a:off x="2182566" y="4934006"/>
+            <a:off x="2182566" y="4901348"/>
             <a:ext cx="1380994" cy="685800"/>
           </a:xfrm>
           <a:prstGeom prst="roundRect">
@@ -17735,8 +17650,8 @@
         </p:nvCxnSpPr>
         <p:spPr>
           <a:xfrm flipH="1">
-            <a:off x="3532644" y="3071729"/>
-            <a:ext cx="1084357" cy="1930762"/>
+            <a:off x="3532645" y="3086100"/>
+            <a:ext cx="974521" cy="1916391"/>
           </a:xfrm>
           <a:prstGeom prst="line">
             <a:avLst/>
@@ -17835,8 +17750,8 @@
         </p:nvCxnSpPr>
         <p:spPr>
           <a:xfrm>
-            <a:off x="2873063" y="5619806"/>
-            <a:ext cx="868" cy="347630"/>
+            <a:off x="2873063" y="5587148"/>
+            <a:ext cx="868" cy="380288"/>
           </a:xfrm>
           <a:prstGeom prst="line">
             <a:avLst/>
@@ -17977,7 +17892,7 @@
         </p:nvSpPr>
         <p:spPr>
           <a:xfrm>
-            <a:off x="2939218" y="5767475"/>
+            <a:off x="2928332" y="5767475"/>
             <a:ext cx="620683" cy="215444"/>
           </a:xfrm>
           <a:prstGeom prst="rect">
@@ -18018,8 +17933,8 @@
         </p:nvSpPr>
         <p:spPr>
           <a:xfrm>
-            <a:off x="3124729" y="4711882"/>
-            <a:ext cx="439223" cy="215444"/>
+            <a:off x="3149939" y="4504107"/>
+            <a:ext cx="439223" cy="430887"/>
           </a:xfrm>
           <a:prstGeom prst="rect">
             <a:avLst/>
@@ -18043,38 +17958,6 @@
               <a:t>Kafka</a:t>
             </a:r>
           </a:p>
-        </p:txBody>
-      </p:sp>
-      <p:sp>
-        <p:nvSpPr>
-          <p:cNvPr id="90" name="TextBox 89">
-            <a:extLst>
-              <a:ext uri="{FF2B5EF4-FFF2-40B4-BE49-F238E27FC236}">
-                <a16:creationId xmlns:a16="http://schemas.microsoft.com/office/drawing/2014/main" id="{C5F3E515-6D28-2349-971F-4D8FF9AFB2FC}"/>
-              </a:ext>
-            </a:extLst>
-          </p:cNvPr>
-          <p:cNvSpPr txBox="1"/>
-          <p:nvPr/>
-        </p:nvSpPr>
-        <p:spPr>
-          <a:xfrm>
-            <a:off x="3663826" y="4826284"/>
-            <a:ext cx="402995" cy="215444"/>
-          </a:xfrm>
-          <a:prstGeom prst="rect">
-            <a:avLst/>
-          </a:prstGeom>
-          <a:noFill/>
-          <a:ln>
-            <a:noFill/>
-          </a:ln>
-        </p:spPr>
-        <p:txBody>
-          <a:bodyPr wrap="none" lIns="0" tIns="0" rIns="0" bIns="0" rtlCol="0">
-            <a:spAutoFit/>
-          </a:bodyPr>
-          <a:lstStyle/>
           <a:p>
             <a:r>
               <a:rPr lang="en-US" sz="1400" i="1" kern="0" spc="-30" dirty="0">
@@ -18100,8 +17983,8 @@
         </p:nvSpPr>
         <p:spPr>
           <a:xfrm>
-            <a:off x="3910989" y="6046680"/>
-            <a:ext cx="473528" cy="215444"/>
+            <a:off x="4012383" y="6059181"/>
+            <a:ext cx="357149" cy="215444"/>
           </a:xfrm>
           <a:prstGeom prst="rect">
             <a:avLst/>
@@ -18122,7 +18005,7 @@
                 <a:latin typeface="Arial"/>
                 <a:cs typeface="Arial"/>
               </a:rPr>
-              <a:t>POST</a:t>
+              <a:t>GET</a:t>
             </a:r>
           </a:p>
         </p:txBody>
@@ -18453,6 +18336,202 @@
           </a:fontRef>
         </p:style>
       </p:cxnSp>
+      <p:cxnSp>
+        <p:nvCxnSpPr>
+          <p:cNvPr id="79" name="Straight Connector 78">
+            <a:extLst>
+              <a:ext uri="{FF2B5EF4-FFF2-40B4-BE49-F238E27FC236}">
+                <a16:creationId xmlns:a16="http://schemas.microsoft.com/office/drawing/2014/main" id="{BAF1A127-328C-AF45-A345-B926999C6103}"/>
+              </a:ext>
+            </a:extLst>
+          </p:cNvPr>
+          <p:cNvCxnSpPr>
+            <a:cxnSpLocks/>
+          </p:cNvCxnSpPr>
+          <p:nvPr/>
+        </p:nvCxnSpPr>
+        <p:spPr>
+          <a:xfrm flipH="1">
+            <a:off x="3423659" y="3086100"/>
+            <a:ext cx="1213655" cy="3176024"/>
+          </a:xfrm>
+          <a:prstGeom prst="line">
+            <a:avLst/>
+          </a:prstGeom>
+          <a:ln w="19050">
+            <a:solidFill>
+              <a:schemeClr val="tx1"/>
+            </a:solidFill>
+            <a:tailEnd type="arrow"/>
+          </a:ln>
+        </p:spPr>
+        <p:style>
+          <a:lnRef idx="1">
+            <a:schemeClr val="accent1"/>
+          </a:lnRef>
+          <a:fillRef idx="0">
+            <a:schemeClr val="accent1"/>
+          </a:fillRef>
+          <a:effectRef idx="0">
+            <a:schemeClr val="accent1"/>
+          </a:effectRef>
+          <a:fontRef idx="minor">
+            <a:schemeClr val="tx1"/>
+          </a:fontRef>
+        </p:style>
+      </p:cxnSp>
+      <p:sp>
+        <p:nvSpPr>
+          <p:cNvPr id="95" name="TextBox 94">
+            <a:extLst>
+              <a:ext uri="{FF2B5EF4-FFF2-40B4-BE49-F238E27FC236}">
+                <a16:creationId xmlns:a16="http://schemas.microsoft.com/office/drawing/2014/main" id="{1F3846B8-9F7C-B349-97A4-CB3799D8AA40}"/>
+              </a:ext>
+            </a:extLst>
+          </p:cNvPr>
+          <p:cNvSpPr txBox="1"/>
+          <p:nvPr/>
+        </p:nvSpPr>
+        <p:spPr>
+          <a:xfrm>
+            <a:off x="3495313" y="5997447"/>
+            <a:ext cx="357149" cy="215444"/>
+          </a:xfrm>
+          <a:prstGeom prst="rect">
+            <a:avLst/>
+          </a:prstGeom>
+          <a:noFill/>
+          <a:ln>
+            <a:noFill/>
+          </a:ln>
+        </p:spPr>
+        <p:txBody>
+          <a:bodyPr wrap="none" lIns="0" tIns="0" rIns="0" bIns="0" rtlCol="0">
+            <a:spAutoFit/>
+          </a:bodyPr>
+          <a:lstStyle/>
+          <a:p>
+            <a:r>
+              <a:rPr lang="en-US" sz="1400" i="1" kern="0" spc="-30" dirty="0">
+                <a:latin typeface="Arial"/>
+                <a:cs typeface="Arial"/>
+              </a:rPr>
+              <a:t>GET</a:t>
+            </a:r>
+          </a:p>
+        </p:txBody>
+      </p:sp>
+      <p:sp>
+        <p:nvSpPr>
+          <p:cNvPr id="16" name="Rounded Rectangle 15">
+            <a:extLst>
+              <a:ext uri="{FF2B5EF4-FFF2-40B4-BE49-F238E27FC236}">
+                <a16:creationId xmlns:a16="http://schemas.microsoft.com/office/drawing/2014/main" id="{5795AE4E-CE2B-6D4F-A105-5A725C137F3B}"/>
+              </a:ext>
+            </a:extLst>
+          </p:cNvPr>
+          <p:cNvSpPr/>
+          <p:nvPr/>
+        </p:nvSpPr>
+        <p:spPr>
+          <a:xfrm>
+            <a:off x="6196176" y="4621097"/>
+            <a:ext cx="1518272" cy="2108030"/>
+          </a:xfrm>
+          <a:prstGeom prst="roundRect">
+            <a:avLst/>
+          </a:prstGeom>
+          <a:noFill/>
+          <a:ln w="12700">
+            <a:solidFill>
+              <a:srgbClr val="FF0000"/>
+            </a:solidFill>
+          </a:ln>
+          <a:effectLst/>
+        </p:spPr>
+        <p:style>
+          <a:lnRef idx="1">
+            <a:schemeClr val="accent1"/>
+          </a:lnRef>
+          <a:fillRef idx="3">
+            <a:schemeClr val="accent1"/>
+          </a:fillRef>
+          <a:effectRef idx="2">
+            <a:schemeClr val="accent1"/>
+          </a:effectRef>
+          <a:fontRef idx="minor">
+            <a:schemeClr val="lt1"/>
+          </a:fontRef>
+        </p:style>
+        <p:txBody>
+          <a:bodyPr rtlCol="0" anchor="t" anchorCtr="0"/>
+          <a:lstStyle/>
+          <a:p>
+            <a:pPr algn="ctr"/>
+            <a:r>
+              <a:rPr lang="en-US" sz="1050" dirty="0">
+                <a:solidFill>
+                  <a:srgbClr val="FF0000"/>
+                </a:solidFill>
+              </a:rPr>
+              <a:t>Notification</a:t>
+            </a:r>
+            <a:r>
+              <a:rPr lang="en-US" sz="1050" dirty="0"/>
+              <a:t> </a:t>
+            </a:r>
+            <a:r>
+              <a:rPr lang="en-US" sz="1050" dirty="0">
+                <a:solidFill>
+                  <a:srgbClr val="FF0000"/>
+                </a:solidFill>
+              </a:rPr>
+              <a:t>Service</a:t>
+            </a:r>
+          </a:p>
+        </p:txBody>
+      </p:sp>
+      <p:sp>
+        <p:nvSpPr>
+          <p:cNvPr id="96" name="TextBox 95">
+            <a:extLst>
+              <a:ext uri="{FF2B5EF4-FFF2-40B4-BE49-F238E27FC236}">
+                <a16:creationId xmlns:a16="http://schemas.microsoft.com/office/drawing/2014/main" id="{72922834-EFF1-3349-BC81-574F1F285EFE}"/>
+              </a:ext>
+            </a:extLst>
+          </p:cNvPr>
+          <p:cNvSpPr txBox="1"/>
+          <p:nvPr/>
+        </p:nvSpPr>
+        <p:spPr>
+          <a:xfrm>
+            <a:off x="3910989" y="6349958"/>
+            <a:ext cx="473528" cy="215444"/>
+          </a:xfrm>
+          <a:prstGeom prst="rect">
+            <a:avLst/>
+          </a:prstGeom>
+          <a:noFill/>
+          <a:ln>
+            <a:noFill/>
+          </a:ln>
+        </p:spPr>
+        <p:txBody>
+          <a:bodyPr wrap="none" lIns="0" tIns="0" rIns="0" bIns="0" rtlCol="0">
+            <a:spAutoFit/>
+          </a:bodyPr>
+          <a:lstStyle/>
+          <a:p>
+            <a:r>
+              <a:rPr lang="en-US" sz="1400" i="1" kern="0" spc="-30" dirty="0">
+                <a:latin typeface="Arial"/>
+                <a:cs typeface="Arial"/>
+              </a:rPr>
+              <a:t>POST</a:t>
+            </a:r>
+          </a:p>
+        </p:txBody>
+      </p:sp>
     </p:spTree>
     <p:extLst>
       <p:ext uri="{BB962C8B-B14F-4D97-AF65-F5344CB8AC3E}">
@@ -18665,6 +18744,217 @@
     <p:extLst>
       <p:ext uri="{BB962C8B-B14F-4D97-AF65-F5344CB8AC3E}">
         <p14:creationId xmlns:p14="http://schemas.microsoft.com/office/powerpoint/2010/main" val="3959974495"/>
+      </p:ext>
+    </p:extLst>
+  </p:cSld>
+  <p:clrMapOvr>
+    <a:masterClrMapping/>
+  </p:clrMapOvr>
+  <p:transition spd="med"/>
+</p:sld>
+</file>
+
+<file path=ppt/slides/slide3.xml><?xml version="1.0" encoding="utf-8"?>
+<p:sld xmlns:a="http://schemas.openxmlformats.org/drawingml/2006/main" xmlns:r="http://schemas.openxmlformats.org/officeDocument/2006/relationships" xmlns:p="http://schemas.openxmlformats.org/presentationml/2006/main">
+  <p:cSld>
+    <p:spTree>
+      <p:nvGrpSpPr>
+        <p:cNvPr id="1" name=""/>
+        <p:cNvGrpSpPr/>
+        <p:nvPr/>
+      </p:nvGrpSpPr>
+      <p:grpSpPr>
+        <a:xfrm>
+          <a:off x="0" y="0"/>
+          <a:ext cx="0" cy="0"/>
+          <a:chOff x="0" y="0"/>
+          <a:chExt cx="0" cy="0"/>
+        </a:xfrm>
+      </p:grpSpPr>
+      <p:sp>
+        <p:nvSpPr>
+          <p:cNvPr id="7" name="Title 1">
+            <a:extLst>
+              <a:ext uri="{FF2B5EF4-FFF2-40B4-BE49-F238E27FC236}">
+                <a16:creationId xmlns:a16="http://schemas.microsoft.com/office/drawing/2014/main" id="{F402E97C-6064-3C42-BD8A-DA2312007200}"/>
+              </a:ext>
+            </a:extLst>
+          </p:cNvPr>
+          <p:cNvSpPr txBox="1">
+            <a:spLocks/>
+          </p:cNvSpPr>
+          <p:nvPr/>
+        </p:nvSpPr>
+        <p:spPr>
+          <a:xfrm>
+            <a:off x="487552" y="243843"/>
+            <a:ext cx="11701273" cy="430887"/>
+          </a:xfrm>
+          <a:prstGeom prst="rect">
+            <a:avLst/>
+          </a:prstGeom>
+        </p:spPr>
+        <p:txBody>
+          <a:bodyPr/>
+          <a:lstStyle>
+            <a:lvl1pPr algn="l" defTabSz="457118" rtl="0" eaLnBrk="1" latinLnBrk="0" hangingPunct="1">
+              <a:spcBef>
+                <a:spcPct val="0"/>
+              </a:spcBef>
+              <a:buNone/>
+              <a:defRPr sz="2400" b="1" kern="0" spc="-31">
+                <a:solidFill>
+                  <a:srgbClr val="009EE2"/>
+                </a:solidFill>
+                <a:latin typeface="+mj-lt"/>
+                <a:ea typeface="+mj-ea"/>
+                <a:cs typeface="+mj-cs"/>
+              </a:defRPr>
+            </a:lvl1pPr>
+          </a:lstStyle>
+          <a:p>
+            <a:r>
+              <a:rPr lang="en-US" sz="2800" dirty="0"/>
+              <a:t>Source for Stock Trader helm chart icon</a:t>
+            </a:r>
+          </a:p>
+        </p:txBody>
+      </p:sp>
+      <p:sp>
+        <p:nvSpPr>
+          <p:cNvPr id="9" name="TextBox 8">
+            <a:extLst>
+              <a:ext uri="{FF2B5EF4-FFF2-40B4-BE49-F238E27FC236}">
+                <a16:creationId xmlns:a16="http://schemas.microsoft.com/office/drawing/2014/main" id="{248D9117-ECCB-894A-A1BC-91B7D2FD8A38}"/>
+              </a:ext>
+            </a:extLst>
+          </p:cNvPr>
+          <p:cNvSpPr txBox="1"/>
+          <p:nvPr/>
+        </p:nvSpPr>
+        <p:spPr>
+          <a:xfrm>
+            <a:off x="1562100" y="1244600"/>
+            <a:ext cx="5740400" cy="1200329"/>
+          </a:xfrm>
+          <a:prstGeom prst="rect">
+            <a:avLst/>
+          </a:prstGeom>
+          <a:noFill/>
+        </p:spPr>
+        <p:txBody>
+          <a:bodyPr wrap="square" rtlCol="0">
+            <a:spAutoFit/>
+          </a:bodyPr>
+          <a:lstStyle/>
+          <a:p>
+            <a:pPr algn="r" defTabSz="914400"/>
+            <a:r>
+              <a:rPr lang="en-US" sz="1800" b="1" dirty="0">
+                <a:solidFill>
+                  <a:srgbClr val="0057FF"/>
+                </a:solidFill>
+                <a:latin typeface="Calibri" panose="020F0502020204030204"/>
+              </a:rPr>
+              <a:t>IBM</a:t>
+            </a:r>
+            <a:r>
+              <a:rPr lang="en-US" sz="1800" dirty="0">
+                <a:solidFill>
+                  <a:prstClr val="black"/>
+                </a:solidFill>
+                <a:latin typeface="Calibri" panose="020F0502020204030204"/>
+              </a:rPr>
+              <a:t>:  </a:t>
+            </a:r>
+            <a:r>
+              <a:rPr lang="en-US" sz="1800" dirty="0">
+                <a:solidFill>
+                  <a:srgbClr val="00FF00"/>
+                </a:solidFill>
+                <a:latin typeface="Calibri" panose="020F0502020204030204"/>
+              </a:rPr>
+              <a:t>$138.56</a:t>
+            </a:r>
+          </a:p>
+          <a:p>
+            <a:pPr algn="r" defTabSz="914400"/>
+            <a:r>
+              <a:rPr lang="en-US" sz="1800" b="1" dirty="0">
+                <a:solidFill>
+                  <a:srgbClr val="FF0000"/>
+                </a:solidFill>
+                <a:latin typeface="Calibri" panose="020F0502020204030204"/>
+              </a:rPr>
+              <a:t>RHT</a:t>
+            </a:r>
+            <a:r>
+              <a:rPr lang="en-US" sz="1800" dirty="0">
+                <a:solidFill>
+                  <a:prstClr val="black"/>
+                </a:solidFill>
+                <a:latin typeface="Calibri" panose="020F0502020204030204"/>
+              </a:rPr>
+              <a:t>:  $181.58</a:t>
+            </a:r>
+          </a:p>
+          <a:p>
+            <a:pPr algn="r" defTabSz="914400"/>
+            <a:r>
+              <a:rPr lang="en-US" sz="1800" b="1" dirty="0">
+                <a:solidFill>
+                  <a:prstClr val="black"/>
+                </a:solidFill>
+                <a:latin typeface="Calibri" panose="020F0502020204030204"/>
+              </a:rPr>
+              <a:t>TSLA</a:t>
+            </a:r>
+            <a:r>
+              <a:rPr lang="en-US" sz="1800" dirty="0">
+                <a:solidFill>
+                  <a:prstClr val="black"/>
+                </a:solidFill>
+                <a:latin typeface="Calibri" panose="020F0502020204030204"/>
+              </a:rPr>
+              <a:t>: $288.96</a:t>
+            </a:r>
+          </a:p>
+          <a:p>
+            <a:pPr algn="r" defTabSz="914400"/>
+            <a:r>
+              <a:rPr lang="en-US" sz="1800" b="1" dirty="0">
+                <a:solidFill>
+                  <a:srgbClr val="0057FF"/>
+                </a:solidFill>
+                <a:latin typeface="Calibri" panose="020F0502020204030204"/>
+              </a:rPr>
+              <a:t>FB</a:t>
+            </a:r>
+            <a:r>
+              <a:rPr lang="en-US" sz="1800" dirty="0">
+                <a:solidFill>
+                  <a:prstClr val="black"/>
+                </a:solidFill>
+                <a:latin typeface="Calibri" panose="020F0502020204030204"/>
+              </a:rPr>
+              <a:t>:    </a:t>
+            </a:r>
+            <a:r>
+              <a:rPr lang="en-US" sz="1800" dirty="0">
+                <a:solidFill>
+                  <a:srgbClr val="FF0000"/>
+                </a:solidFill>
+                <a:latin typeface="Calibri" panose="020F0502020204030204"/>
+              </a:rPr>
+              <a:t> $173.37</a:t>
+            </a:r>
+          </a:p>
+        </p:txBody>
+      </p:sp>
+    </p:spTree>
+    <p:extLst>
+      <p:ext uri="{BB962C8B-B14F-4D97-AF65-F5344CB8AC3E}">
+        <p14:creationId xmlns:p14="http://schemas.microsoft.com/office/powerpoint/2010/main" val="1072164646"/>
       </p:ext>
     </p:extLst>
   </p:cSld>

</xml_diff>